<commit_message>
finalizaçoes codigo, doc e slide
</commit_message>
<xml_diff>
--- a/Documentação/BALANCEAMENTO DE LINHA DE PRODUÇÃO.pptx
+++ b/Documentação/BALANCEAMENTO DE LINHA DE PRODUÇÃO.pptx
@@ -4,6 +4,9 @@
   <p:sldMasterIdLst>
     <p:sldMasterId id="2147483982" r:id="rId1"/>
   </p:sldMasterIdLst>
+  <p:notesMasterIdLst>
+    <p:notesMasterId r:id="rId23"/>
+  </p:notesMasterIdLst>
   <p:sldIdLst>
     <p:sldId id="256" r:id="rId2"/>
     <p:sldId id="258" r:id="rId3"/>
@@ -14,16 +17,18 @@
     <p:sldId id="263" r:id="rId8"/>
     <p:sldId id="274" r:id="rId9"/>
     <p:sldId id="265" r:id="rId10"/>
-    <p:sldId id="266" r:id="rId11"/>
-    <p:sldId id="275" r:id="rId12"/>
-    <p:sldId id="267" r:id="rId13"/>
-    <p:sldId id="268" r:id="rId14"/>
-    <p:sldId id="269" r:id="rId15"/>
-    <p:sldId id="270" r:id="rId16"/>
-    <p:sldId id="257" r:id="rId17"/>
-    <p:sldId id="271" r:id="rId18"/>
-    <p:sldId id="272" r:id="rId19"/>
-    <p:sldId id="273" r:id="rId20"/>
+    <p:sldId id="276" r:id="rId11"/>
+    <p:sldId id="266" r:id="rId12"/>
+    <p:sldId id="277" r:id="rId13"/>
+    <p:sldId id="275" r:id="rId14"/>
+    <p:sldId id="267" r:id="rId15"/>
+    <p:sldId id="268" r:id="rId16"/>
+    <p:sldId id="269" r:id="rId17"/>
+    <p:sldId id="270" r:id="rId18"/>
+    <p:sldId id="257" r:id="rId19"/>
+    <p:sldId id="271" r:id="rId20"/>
+    <p:sldId id="272" r:id="rId21"/>
+    <p:sldId id="273" r:id="rId22"/>
   </p:sldIdLst>
   <p:sldSz cx="12192000" cy="6858000"/>
   <p:notesSz cx="6858000" cy="9144000"/>
@@ -125,7 +130,7 @@
   <p:extLst>
     <p:ext uri="{EFAFB233-063F-42B5-8137-9DF3F51BA10A}">
       <p15:sldGuideLst xmlns:p15="http://schemas.microsoft.com/office/powerpoint/2012/main">
-        <p15:guide id="1" orient="horz" pos="2137" userDrawn="1">
+        <p15:guide id="1" orient="horz" pos="2205" userDrawn="1">
           <p15:clr>
             <a:srgbClr val="A4A3A4"/>
           </p15:clr>
@@ -139,6 +144,18 @@
     </p:ext>
   </p:extLst>
 </p:presentation>
+</file>
+
+<file path=ppt/commentAuthors.xml><?xml version="1.0" encoding="utf-8"?>
+<p:cmAuthorLst xmlns:a="http://schemas.openxmlformats.org/drawingml/2006/main" xmlns:r="http://schemas.openxmlformats.org/officeDocument/2006/relationships" xmlns:p="http://schemas.openxmlformats.org/presentationml/2006/main">
+  <p:cmAuthor id="1" name="Ruan Nicolini" initials="RN" lastIdx="1" clrIdx="0">
+    <p:extLst>
+      <p:ext uri="{19B8F6BF-5375-455C-9EA6-DF929625EA0E}">
+        <p15:presenceInfo xmlns:p15="http://schemas.microsoft.com/office/powerpoint/2012/main" userId="a5eb43ef1153ddb9" providerId="Windows Live"/>
+      </p:ext>
+    </p:extLst>
+  </p:cmAuthor>
+</p:cmAuthorLst>
 </file>
 
 <file path=ppt/charts/chart1.xml><?xml version="1.0" encoding="utf-8"?>
@@ -162,7 +179,7 @@
           <a:lstStyle/>
           <a:p>
             <a:pPr>
-              <a:defRPr sz="1995" b="1" i="0" u="none" strike="noStrike" kern="1200" cap="all" spc="100" normalizeH="0" baseline="0">
+              <a:defRPr sz="2200" b="1" i="0" u="none" strike="noStrike" kern="1200" cap="all" spc="100" normalizeH="0" baseline="0">
                 <a:solidFill>
                   <a:schemeClr val="lt1"/>
                 </a:solidFill>
@@ -172,42 +189,42 @@
               </a:defRPr>
             </a:pPr>
             <a:r>
-              <a:rPr lang="en-US" dirty="0" err="1" smtClean="0"/>
+              <a:rPr lang="en-US" sz="2200" dirty="0" err="1" smtClean="0"/>
               <a:t>Postos</a:t>
             </a:r>
             <a:r>
-              <a:rPr lang="en-US" dirty="0" smtClean="0"/>
+              <a:rPr lang="en-US" sz="2200" dirty="0" smtClean="0"/>
               <a:t> de </a:t>
             </a:r>
             <a:r>
-              <a:rPr lang="en-US" dirty="0" err="1" smtClean="0"/>
+              <a:rPr lang="en-US" sz="2200" dirty="0" err="1" smtClean="0"/>
               <a:t>trabalho</a:t>
             </a:r>
             <a:r>
-              <a:rPr lang="en-US" dirty="0" smtClean="0"/>
+              <a:rPr lang="en-US" sz="2200" dirty="0" smtClean="0"/>
               <a:t> </a:t>
             </a:r>
             <a:r>
-              <a:rPr lang="en-US" dirty="0" err="1" smtClean="0"/>
+              <a:rPr lang="en-US" sz="2200" dirty="0" err="1" smtClean="0"/>
               <a:t>gerados</a:t>
             </a:r>
             <a:r>
-              <a:rPr lang="en-US" dirty="0" smtClean="0"/>
+              <a:rPr lang="en-US" sz="2200" dirty="0" smtClean="0"/>
               <a:t> pela </a:t>
             </a:r>
             <a:r>
-              <a:rPr lang="en-US" dirty="0" err="1" smtClean="0"/>
+              <a:rPr lang="en-US" sz="2200" dirty="0" err="1" smtClean="0"/>
               <a:t>indústria</a:t>
             </a:r>
             <a:r>
-              <a:rPr lang="en-US" baseline="0" dirty="0" smtClean="0"/>
+              <a:rPr lang="en-US" sz="2200" baseline="0" dirty="0" smtClean="0"/>
               <a:t> de </a:t>
             </a:r>
             <a:r>
-              <a:rPr lang="en-US" baseline="0" dirty="0" err="1" smtClean="0"/>
+              <a:rPr lang="en-US" sz="2200" baseline="0" dirty="0" err="1" smtClean="0"/>
               <a:t>confecção</a:t>
             </a:r>
-            <a:endParaRPr lang="en-US" dirty="0"/>
+            <a:endParaRPr lang="en-US" sz="2200" dirty="0"/>
           </a:p>
         </c:rich>
       </c:tx>
@@ -225,7 +242,7 @@
         <a:lstStyle/>
         <a:p>
           <a:pPr>
-            <a:defRPr sz="1995" b="1" i="0" u="none" strike="noStrike" kern="1200" cap="all" spc="100" normalizeH="0" baseline="0">
+            <a:defRPr sz="2200" b="1" i="0" u="none" strike="noStrike" kern="1200" cap="all" spc="100" normalizeH="0" baseline="0">
               <a:solidFill>
                 <a:schemeClr val="lt1"/>
               </a:solidFill>
@@ -275,6 +292,196 @@
             <c:symbol val="none"/>
           </c:marker>
           <c:dLbls>
+            <c:dLbl>
+              <c:idx val="0"/>
+              <c:spPr>
+                <a:solidFill>
+                  <a:schemeClr val="accent2"/>
+                </a:solidFill>
+                <a:ln>
+                  <a:noFill/>
+                </a:ln>
+                <a:effectLst/>
+              </c:spPr>
+              <c:txPr>
+                <a:bodyPr rot="0" spcFirstLastPara="1" vertOverflow="ellipsis" vert="horz" wrap="square" lIns="38100" tIns="19050" rIns="38100" bIns="19050" anchor="ctr" anchorCtr="1">
+                  <a:spAutoFit/>
+                </a:bodyPr>
+                <a:lstStyle/>
+                <a:p>
+                  <a:pPr>
+                    <a:defRPr sz="2400" b="1" i="0" u="none" strike="noStrike" kern="1200" baseline="0">
+                      <a:solidFill>
+                        <a:schemeClr val="lt1"/>
+                      </a:solidFill>
+                      <a:latin typeface="+mn-lt"/>
+                      <a:ea typeface="+mn-ea"/>
+                      <a:cs typeface="+mn-cs"/>
+                    </a:defRPr>
+                  </a:pPr>
+                  <a:endParaRPr lang="pt-BR"/>
+                </a:p>
+              </c:txPr>
+              <c:dLblPos val="ctr"/>
+              <c:showLegendKey val="0"/>
+              <c:showVal val="1"/>
+              <c:showCatName val="0"/>
+              <c:showSerName val="0"/>
+              <c:showPercent val="0"/>
+              <c:showBubbleSize val="0"/>
+            </c:dLbl>
+            <c:dLbl>
+              <c:idx val="1"/>
+              <c:spPr>
+                <a:solidFill>
+                  <a:schemeClr val="accent2"/>
+                </a:solidFill>
+                <a:ln>
+                  <a:noFill/>
+                </a:ln>
+                <a:effectLst/>
+              </c:spPr>
+              <c:txPr>
+                <a:bodyPr rot="0" spcFirstLastPara="1" vertOverflow="ellipsis" vert="horz" wrap="square" lIns="38100" tIns="19050" rIns="38100" bIns="19050" anchor="ctr" anchorCtr="1">
+                  <a:spAutoFit/>
+                </a:bodyPr>
+                <a:lstStyle/>
+                <a:p>
+                  <a:pPr>
+                    <a:defRPr sz="2400" b="1" i="0" u="none" strike="noStrike" kern="1200" baseline="0">
+                      <a:solidFill>
+                        <a:schemeClr val="lt1"/>
+                      </a:solidFill>
+                      <a:latin typeface="+mn-lt"/>
+                      <a:ea typeface="+mn-ea"/>
+                      <a:cs typeface="+mn-cs"/>
+                    </a:defRPr>
+                  </a:pPr>
+                  <a:endParaRPr lang="pt-BR"/>
+                </a:p>
+              </c:txPr>
+              <c:dLblPos val="ctr"/>
+              <c:showLegendKey val="0"/>
+              <c:showVal val="1"/>
+              <c:showCatName val="0"/>
+              <c:showSerName val="0"/>
+              <c:showPercent val="0"/>
+              <c:showBubbleSize val="0"/>
+            </c:dLbl>
+            <c:dLbl>
+              <c:idx val="2"/>
+              <c:spPr>
+                <a:solidFill>
+                  <a:schemeClr val="accent2"/>
+                </a:solidFill>
+                <a:ln>
+                  <a:noFill/>
+                </a:ln>
+                <a:effectLst/>
+              </c:spPr>
+              <c:txPr>
+                <a:bodyPr rot="0" spcFirstLastPara="1" vertOverflow="ellipsis" vert="horz" wrap="square" lIns="38100" tIns="19050" rIns="38100" bIns="19050" anchor="ctr" anchorCtr="1">
+                  <a:spAutoFit/>
+                </a:bodyPr>
+                <a:lstStyle/>
+                <a:p>
+                  <a:pPr>
+                    <a:defRPr sz="2400" b="1" i="0" u="none" strike="noStrike" kern="1200" baseline="0">
+                      <a:solidFill>
+                        <a:schemeClr val="lt1"/>
+                      </a:solidFill>
+                      <a:latin typeface="+mn-lt"/>
+                      <a:ea typeface="+mn-ea"/>
+                      <a:cs typeface="+mn-cs"/>
+                    </a:defRPr>
+                  </a:pPr>
+                  <a:endParaRPr lang="pt-BR"/>
+                </a:p>
+              </c:txPr>
+              <c:dLblPos val="ctr"/>
+              <c:showLegendKey val="0"/>
+              <c:showVal val="1"/>
+              <c:showCatName val="0"/>
+              <c:showSerName val="0"/>
+              <c:showPercent val="0"/>
+              <c:showBubbleSize val="0"/>
+            </c:dLbl>
+            <c:dLbl>
+              <c:idx val="3"/>
+              <c:spPr>
+                <a:solidFill>
+                  <a:schemeClr val="accent2"/>
+                </a:solidFill>
+                <a:ln>
+                  <a:noFill/>
+                </a:ln>
+                <a:effectLst/>
+              </c:spPr>
+              <c:txPr>
+                <a:bodyPr rot="0" spcFirstLastPara="1" vertOverflow="ellipsis" vert="horz" wrap="square" lIns="38100" tIns="19050" rIns="38100" bIns="19050" anchor="ctr" anchorCtr="1">
+                  <a:spAutoFit/>
+                </a:bodyPr>
+                <a:lstStyle/>
+                <a:p>
+                  <a:pPr>
+                    <a:defRPr sz="2400" b="1" i="0" u="none" strike="noStrike" kern="1200" baseline="0">
+                      <a:solidFill>
+                        <a:schemeClr val="lt1"/>
+                      </a:solidFill>
+                      <a:latin typeface="+mn-lt"/>
+                      <a:ea typeface="+mn-ea"/>
+                      <a:cs typeface="+mn-cs"/>
+                    </a:defRPr>
+                  </a:pPr>
+                  <a:endParaRPr lang="pt-BR"/>
+                </a:p>
+              </c:txPr>
+              <c:dLblPos val="ctr"/>
+              <c:showLegendKey val="0"/>
+              <c:showVal val="1"/>
+              <c:showCatName val="0"/>
+              <c:showSerName val="0"/>
+              <c:showPercent val="0"/>
+              <c:showBubbleSize val="0"/>
+            </c:dLbl>
+            <c:dLbl>
+              <c:idx val="4"/>
+              <c:spPr>
+                <a:solidFill>
+                  <a:schemeClr val="accent2"/>
+                </a:solidFill>
+                <a:ln>
+                  <a:noFill/>
+                </a:ln>
+                <a:effectLst/>
+              </c:spPr>
+              <c:txPr>
+                <a:bodyPr rot="0" spcFirstLastPara="1" vertOverflow="ellipsis" vert="horz" wrap="square" lIns="38100" tIns="19050" rIns="38100" bIns="19050" anchor="ctr" anchorCtr="1">
+                  <a:spAutoFit/>
+                </a:bodyPr>
+                <a:lstStyle/>
+                <a:p>
+                  <a:pPr>
+                    <a:defRPr sz="2400" b="1" i="0" u="none" strike="noStrike" kern="1200" baseline="0">
+                      <a:solidFill>
+                        <a:schemeClr val="lt1"/>
+                      </a:solidFill>
+                      <a:latin typeface="+mn-lt"/>
+                      <a:ea typeface="+mn-ea"/>
+                      <a:cs typeface="+mn-cs"/>
+                    </a:defRPr>
+                  </a:pPr>
+                  <a:endParaRPr lang="pt-BR"/>
+                </a:p>
+              </c:txPr>
+              <c:dLblPos val="ctr"/>
+              <c:showLegendKey val="0"/>
+              <c:showVal val="1"/>
+              <c:showCatName val="0"/>
+              <c:showSerName val="0"/>
+              <c:showPercent val="0"/>
+              <c:showBubbleSize val="0"/>
+            </c:dLbl>
             <c:spPr>
               <a:solidFill>
                 <a:schemeClr val="accent2"/>
@@ -313,7 +520,6 @@
             <c:showLeaderLines val="0"/>
             <c:extLst>
               <c:ext xmlns:c15="http://schemas.microsoft.com/office/drawing/2012/chart" uri="{CE6537A1-D6FC-4f65-9D91-7224C49458BB}">
-                <c15:layout/>
                 <c15:showLeaderLines val="1"/>
                 <c15:leaderLines>
                   <c:spPr>
@@ -412,11 +618,11 @@
           </c:spPr>
         </c:dropLines>
         <c:smooth val="0"/>
-        <c:axId val="254131016"/>
-        <c:axId val="254132192"/>
+        <c:axId val="247746616"/>
+        <c:axId val="247748576"/>
       </c:lineChart>
       <c:catAx>
-        <c:axId val="254131016"/>
+        <c:axId val="247746616"/>
         <c:scaling>
           <c:orientation val="minMax"/>
         </c:scaling>
@@ -438,7 +644,7 @@
           <a:lstStyle/>
           <a:p>
             <a:pPr>
-              <a:defRPr sz="1197" b="0" i="0" u="none" strike="noStrike" kern="1200" spc="30" baseline="0">
+              <a:defRPr sz="2000" b="0" i="0" u="none" strike="noStrike" kern="1200" spc="30" baseline="0">
                 <a:solidFill>
                   <a:schemeClr val="lt1"/>
                 </a:solidFill>
@@ -450,7 +656,7 @@
             <a:endParaRPr lang="pt-BR"/>
           </a:p>
         </c:txPr>
-        <c:crossAx val="254132192"/>
+        <c:crossAx val="247748576"/>
         <c:crosses val="autoZero"/>
         <c:auto val="1"/>
         <c:lblAlgn val="ctr"/>
@@ -458,7 +664,7 @@
         <c:noMultiLvlLbl val="0"/>
       </c:catAx>
       <c:valAx>
-        <c:axId val="254132192"/>
+        <c:axId val="247748576"/>
         <c:scaling>
           <c:orientation val="minMax"/>
         </c:scaling>
@@ -468,7 +674,7 @@
         <c:majorTickMark val="none"/>
         <c:minorTickMark val="none"/>
         <c:tickLblPos val="nextTo"/>
-        <c:crossAx val="254131016"/>
+        <c:crossAx val="247746616"/>
         <c:crosses val="autoZero"/>
         <c:crossBetween val="between"/>
       </c:valAx>
@@ -496,7 +702,7 @@
         <a:lstStyle/>
         <a:p>
           <a:pPr>
-            <a:defRPr sz="1197" b="0" i="0" u="none" strike="noStrike" kern="1200" baseline="0">
+            <a:defRPr sz="2000" b="0" i="0" u="none" strike="noStrike" kern="1200" baseline="0">
               <a:solidFill>
                 <a:schemeClr val="lt1"/>
               </a:solidFill>
@@ -1060,6 +1266,1487 @@
     </cs:fontRef>
   </cs:wall>
 </cs:chartStyle>
+</file>
+
+<file path=ppt/notesMasters/notesMaster1.xml><?xml version="1.0" encoding="utf-8"?>
+<p:notesMaster xmlns:a="http://schemas.openxmlformats.org/drawingml/2006/main" xmlns:r="http://schemas.openxmlformats.org/officeDocument/2006/relationships" xmlns:p="http://schemas.openxmlformats.org/presentationml/2006/main">
+  <p:cSld>
+    <p:bg>
+      <p:bgRef idx="1001">
+        <a:schemeClr val="bg1"/>
+      </p:bgRef>
+    </p:bg>
+    <p:spTree>
+      <p:nvGrpSpPr>
+        <p:cNvPr id="1" name=""/>
+        <p:cNvGrpSpPr/>
+        <p:nvPr/>
+      </p:nvGrpSpPr>
+      <p:grpSpPr>
+        <a:xfrm>
+          <a:off x="0" y="0"/>
+          <a:ext cx="0" cy="0"/>
+          <a:chOff x="0" y="0"/>
+          <a:chExt cx="0" cy="0"/>
+        </a:xfrm>
+      </p:grpSpPr>
+      <p:sp>
+        <p:nvSpPr>
+          <p:cNvPr id="2" name="Espaço Reservado para Cabeçalho 1"/>
+          <p:cNvSpPr>
+            <a:spLocks noGrp="1"/>
+          </p:cNvSpPr>
+          <p:nvPr>
+            <p:ph type="hdr" sz="quarter"/>
+          </p:nvPr>
+        </p:nvSpPr>
+        <p:spPr>
+          <a:xfrm>
+            <a:off x="0" y="0"/>
+            <a:ext cx="2971800" cy="458788"/>
+          </a:xfrm>
+          <a:prstGeom prst="rect">
+            <a:avLst/>
+          </a:prstGeom>
+        </p:spPr>
+        <p:txBody>
+          <a:bodyPr vert="horz" lIns="91440" tIns="45720" rIns="91440" bIns="45720" rtlCol="0"/>
+          <a:lstStyle>
+            <a:lvl1pPr algn="l">
+              <a:defRPr sz="1200"/>
+            </a:lvl1pPr>
+          </a:lstStyle>
+          <a:p>
+            <a:endParaRPr lang="pt-BR"/>
+          </a:p>
+        </p:txBody>
+      </p:sp>
+      <p:sp>
+        <p:nvSpPr>
+          <p:cNvPr id="3" name="Espaço Reservado para Data 2"/>
+          <p:cNvSpPr>
+            <a:spLocks noGrp="1"/>
+          </p:cNvSpPr>
+          <p:nvPr>
+            <p:ph type="dt" idx="1"/>
+          </p:nvPr>
+        </p:nvSpPr>
+        <p:spPr>
+          <a:xfrm>
+            <a:off x="3884613" y="0"/>
+            <a:ext cx="2971800" cy="458788"/>
+          </a:xfrm>
+          <a:prstGeom prst="rect">
+            <a:avLst/>
+          </a:prstGeom>
+        </p:spPr>
+        <p:txBody>
+          <a:bodyPr vert="horz" lIns="91440" tIns="45720" rIns="91440" bIns="45720" rtlCol="0"/>
+          <a:lstStyle>
+            <a:lvl1pPr algn="r">
+              <a:defRPr sz="1200"/>
+            </a:lvl1pPr>
+          </a:lstStyle>
+          <a:p>
+            <a:fld id="{E71871E2-B8B4-434E-84AB-E752CA376FB6}" type="datetimeFigureOut">
+              <a:rPr lang="pt-BR" smtClean="0"/>
+              <a:t>11/12/2016</a:t>
+            </a:fld>
+            <a:endParaRPr lang="pt-BR"/>
+          </a:p>
+        </p:txBody>
+      </p:sp>
+      <p:sp>
+        <p:nvSpPr>
+          <p:cNvPr id="4" name="Espaço Reservado para Imagem de Slide 3"/>
+          <p:cNvSpPr>
+            <a:spLocks noGrp="1" noRot="1" noChangeAspect="1"/>
+          </p:cNvSpPr>
+          <p:nvPr>
+            <p:ph type="sldImg" idx="2"/>
+          </p:nvPr>
+        </p:nvSpPr>
+        <p:spPr>
+          <a:xfrm>
+            <a:off x="685800" y="1143000"/>
+            <a:ext cx="5486400" cy="3086100"/>
+          </a:xfrm>
+          <a:prstGeom prst="rect">
+            <a:avLst/>
+          </a:prstGeom>
+          <a:noFill/>
+          <a:ln w="12700">
+            <a:solidFill>
+              <a:prstClr val="black"/>
+            </a:solidFill>
+          </a:ln>
+        </p:spPr>
+        <p:txBody>
+          <a:bodyPr vert="horz" lIns="91440" tIns="45720" rIns="91440" bIns="45720" rtlCol="0" anchor="ctr"/>
+          <a:lstStyle/>
+          <a:p>
+            <a:endParaRPr lang="pt-BR"/>
+          </a:p>
+        </p:txBody>
+      </p:sp>
+      <p:sp>
+        <p:nvSpPr>
+          <p:cNvPr id="5" name="Espaço Reservado para Anotações 4"/>
+          <p:cNvSpPr>
+            <a:spLocks noGrp="1"/>
+          </p:cNvSpPr>
+          <p:nvPr>
+            <p:ph type="body" sz="quarter" idx="3"/>
+          </p:nvPr>
+        </p:nvSpPr>
+        <p:spPr>
+          <a:xfrm>
+            <a:off x="685800" y="4400550"/>
+            <a:ext cx="5486400" cy="3600450"/>
+          </a:xfrm>
+          <a:prstGeom prst="rect">
+            <a:avLst/>
+          </a:prstGeom>
+        </p:spPr>
+        <p:txBody>
+          <a:bodyPr vert="horz" lIns="91440" tIns="45720" rIns="91440" bIns="45720" rtlCol="0"/>
+          <a:lstStyle/>
+          <a:p>
+            <a:pPr lvl="0"/>
+            <a:r>
+              <a:rPr lang="pt-BR" smtClean="0"/>
+              <a:t>Clique para editar o texto mestre</a:t>
+            </a:r>
+          </a:p>
+          <a:p>
+            <a:pPr lvl="1"/>
+            <a:r>
+              <a:rPr lang="pt-BR" smtClean="0"/>
+              <a:t>Segundo nível</a:t>
+            </a:r>
+          </a:p>
+          <a:p>
+            <a:pPr lvl="2"/>
+            <a:r>
+              <a:rPr lang="pt-BR" smtClean="0"/>
+              <a:t>Terceiro nível</a:t>
+            </a:r>
+          </a:p>
+          <a:p>
+            <a:pPr lvl="3"/>
+            <a:r>
+              <a:rPr lang="pt-BR" smtClean="0"/>
+              <a:t>Quarto nível</a:t>
+            </a:r>
+          </a:p>
+          <a:p>
+            <a:pPr lvl="4"/>
+            <a:r>
+              <a:rPr lang="pt-BR" smtClean="0"/>
+              <a:t>Quinto nível</a:t>
+            </a:r>
+            <a:endParaRPr lang="pt-BR"/>
+          </a:p>
+        </p:txBody>
+      </p:sp>
+      <p:sp>
+        <p:nvSpPr>
+          <p:cNvPr id="6" name="Espaço Reservado para Rodapé 5"/>
+          <p:cNvSpPr>
+            <a:spLocks noGrp="1"/>
+          </p:cNvSpPr>
+          <p:nvPr>
+            <p:ph type="ftr" sz="quarter" idx="4"/>
+          </p:nvPr>
+        </p:nvSpPr>
+        <p:spPr>
+          <a:xfrm>
+            <a:off x="0" y="8685213"/>
+            <a:ext cx="2971800" cy="458787"/>
+          </a:xfrm>
+          <a:prstGeom prst="rect">
+            <a:avLst/>
+          </a:prstGeom>
+        </p:spPr>
+        <p:txBody>
+          <a:bodyPr vert="horz" lIns="91440" tIns="45720" rIns="91440" bIns="45720" rtlCol="0" anchor="b"/>
+          <a:lstStyle>
+            <a:lvl1pPr algn="l">
+              <a:defRPr sz="1200"/>
+            </a:lvl1pPr>
+          </a:lstStyle>
+          <a:p>
+            <a:endParaRPr lang="pt-BR"/>
+          </a:p>
+        </p:txBody>
+      </p:sp>
+      <p:sp>
+        <p:nvSpPr>
+          <p:cNvPr id="7" name="Espaço Reservado para Número de Slide 6"/>
+          <p:cNvSpPr>
+            <a:spLocks noGrp="1"/>
+          </p:cNvSpPr>
+          <p:nvPr>
+            <p:ph type="sldNum" sz="quarter" idx="5"/>
+          </p:nvPr>
+        </p:nvSpPr>
+        <p:spPr>
+          <a:xfrm>
+            <a:off x="3884613" y="8685213"/>
+            <a:ext cx="2971800" cy="458787"/>
+          </a:xfrm>
+          <a:prstGeom prst="rect">
+            <a:avLst/>
+          </a:prstGeom>
+        </p:spPr>
+        <p:txBody>
+          <a:bodyPr vert="horz" lIns="91440" tIns="45720" rIns="91440" bIns="45720" rtlCol="0" anchor="b"/>
+          <a:lstStyle>
+            <a:lvl1pPr algn="r">
+              <a:defRPr sz="1200"/>
+            </a:lvl1pPr>
+          </a:lstStyle>
+          <a:p>
+            <a:fld id="{B8C4697C-5588-4126-ACFB-A2CEC35C32B6}" type="slidenum">
+              <a:rPr lang="pt-BR" smtClean="0"/>
+              <a:t>‹nº›</a:t>
+            </a:fld>
+            <a:endParaRPr lang="pt-BR"/>
+          </a:p>
+        </p:txBody>
+      </p:sp>
+    </p:spTree>
+    <p:extLst>
+      <p:ext uri="{BB962C8B-B14F-4D97-AF65-F5344CB8AC3E}">
+        <p14:creationId xmlns:p14="http://schemas.microsoft.com/office/powerpoint/2010/main" val="503110653"/>
+      </p:ext>
+    </p:extLst>
+  </p:cSld>
+  <p:clrMap bg1="lt1" tx1="dk1" bg2="lt2" tx2="dk2" accent1="accent1" accent2="accent2" accent3="accent3" accent4="accent4" accent5="accent5" accent6="accent6" hlink="hlink" folHlink="folHlink"/>
+  <p:notesStyle>
+    <a:lvl1pPr marL="0" algn="l" defTabSz="914400" rtl="0" eaLnBrk="1" latinLnBrk="0" hangingPunct="1">
+      <a:defRPr sz="1200" kern="1200">
+        <a:solidFill>
+          <a:schemeClr val="tx1"/>
+        </a:solidFill>
+        <a:latin typeface="+mn-lt"/>
+        <a:ea typeface="+mn-ea"/>
+        <a:cs typeface="+mn-cs"/>
+      </a:defRPr>
+    </a:lvl1pPr>
+    <a:lvl2pPr marL="457200" algn="l" defTabSz="914400" rtl="0" eaLnBrk="1" latinLnBrk="0" hangingPunct="1">
+      <a:defRPr sz="1200" kern="1200">
+        <a:solidFill>
+          <a:schemeClr val="tx1"/>
+        </a:solidFill>
+        <a:latin typeface="+mn-lt"/>
+        <a:ea typeface="+mn-ea"/>
+        <a:cs typeface="+mn-cs"/>
+      </a:defRPr>
+    </a:lvl2pPr>
+    <a:lvl3pPr marL="914400" algn="l" defTabSz="914400" rtl="0" eaLnBrk="1" latinLnBrk="0" hangingPunct="1">
+      <a:defRPr sz="1200" kern="1200">
+        <a:solidFill>
+          <a:schemeClr val="tx1"/>
+        </a:solidFill>
+        <a:latin typeface="+mn-lt"/>
+        <a:ea typeface="+mn-ea"/>
+        <a:cs typeface="+mn-cs"/>
+      </a:defRPr>
+    </a:lvl3pPr>
+    <a:lvl4pPr marL="1371600" algn="l" defTabSz="914400" rtl="0" eaLnBrk="1" latinLnBrk="0" hangingPunct="1">
+      <a:defRPr sz="1200" kern="1200">
+        <a:solidFill>
+          <a:schemeClr val="tx1"/>
+        </a:solidFill>
+        <a:latin typeface="+mn-lt"/>
+        <a:ea typeface="+mn-ea"/>
+        <a:cs typeface="+mn-cs"/>
+      </a:defRPr>
+    </a:lvl4pPr>
+    <a:lvl5pPr marL="1828800" algn="l" defTabSz="914400" rtl="0" eaLnBrk="1" latinLnBrk="0" hangingPunct="1">
+      <a:defRPr sz="1200" kern="1200">
+        <a:solidFill>
+          <a:schemeClr val="tx1"/>
+        </a:solidFill>
+        <a:latin typeface="+mn-lt"/>
+        <a:ea typeface="+mn-ea"/>
+        <a:cs typeface="+mn-cs"/>
+      </a:defRPr>
+    </a:lvl5pPr>
+    <a:lvl6pPr marL="2286000" algn="l" defTabSz="914400" rtl="0" eaLnBrk="1" latinLnBrk="0" hangingPunct="1">
+      <a:defRPr sz="1200" kern="1200">
+        <a:solidFill>
+          <a:schemeClr val="tx1"/>
+        </a:solidFill>
+        <a:latin typeface="+mn-lt"/>
+        <a:ea typeface="+mn-ea"/>
+        <a:cs typeface="+mn-cs"/>
+      </a:defRPr>
+    </a:lvl6pPr>
+    <a:lvl7pPr marL="2743200" algn="l" defTabSz="914400" rtl="0" eaLnBrk="1" latinLnBrk="0" hangingPunct="1">
+      <a:defRPr sz="1200" kern="1200">
+        <a:solidFill>
+          <a:schemeClr val="tx1"/>
+        </a:solidFill>
+        <a:latin typeface="+mn-lt"/>
+        <a:ea typeface="+mn-ea"/>
+        <a:cs typeface="+mn-cs"/>
+      </a:defRPr>
+    </a:lvl7pPr>
+    <a:lvl8pPr marL="3200400" algn="l" defTabSz="914400" rtl="0" eaLnBrk="1" latinLnBrk="0" hangingPunct="1">
+      <a:defRPr sz="1200" kern="1200">
+        <a:solidFill>
+          <a:schemeClr val="tx1"/>
+        </a:solidFill>
+        <a:latin typeface="+mn-lt"/>
+        <a:ea typeface="+mn-ea"/>
+        <a:cs typeface="+mn-cs"/>
+      </a:defRPr>
+    </a:lvl8pPr>
+    <a:lvl9pPr marL="3657600" algn="l" defTabSz="914400" rtl="0" eaLnBrk="1" latinLnBrk="0" hangingPunct="1">
+      <a:defRPr sz="1200" kern="1200">
+        <a:solidFill>
+          <a:schemeClr val="tx1"/>
+        </a:solidFill>
+        <a:latin typeface="+mn-lt"/>
+        <a:ea typeface="+mn-ea"/>
+        <a:cs typeface="+mn-cs"/>
+      </a:defRPr>
+    </a:lvl9pPr>
+  </p:notesStyle>
+</p:notesMaster>
+</file>
+
+<file path=ppt/notesSlides/notesSlide1.xml><?xml version="1.0" encoding="utf-8"?>
+<p:notes xmlns:a="http://schemas.openxmlformats.org/drawingml/2006/main" xmlns:r="http://schemas.openxmlformats.org/officeDocument/2006/relationships" xmlns:p="http://schemas.openxmlformats.org/presentationml/2006/main">
+  <p:cSld>
+    <p:spTree>
+      <p:nvGrpSpPr>
+        <p:cNvPr id="1" name=""/>
+        <p:cNvGrpSpPr/>
+        <p:nvPr/>
+      </p:nvGrpSpPr>
+      <p:grpSpPr>
+        <a:xfrm>
+          <a:off x="0" y="0"/>
+          <a:ext cx="0" cy="0"/>
+          <a:chOff x="0" y="0"/>
+          <a:chExt cx="0" cy="0"/>
+        </a:xfrm>
+      </p:grpSpPr>
+      <p:sp>
+        <p:nvSpPr>
+          <p:cNvPr id="2" name="Espaço Reservado para Imagem de Slide 1"/>
+          <p:cNvSpPr>
+            <a:spLocks noGrp="1" noRot="1" noChangeAspect="1"/>
+          </p:cNvSpPr>
+          <p:nvPr>
+            <p:ph type="sldImg"/>
+          </p:nvPr>
+        </p:nvSpPr>
+        <p:spPr/>
+      </p:sp>
+      <p:sp>
+        <p:nvSpPr>
+          <p:cNvPr id="3" name="Espaço Reservado para Anotações 2"/>
+          <p:cNvSpPr>
+            <a:spLocks noGrp="1"/>
+          </p:cNvSpPr>
+          <p:nvPr>
+            <p:ph type="body" idx="1"/>
+          </p:nvPr>
+        </p:nvSpPr>
+        <p:spPr/>
+        <p:txBody>
+          <a:bodyPr/>
+          <a:lstStyle/>
+          <a:p>
+            <a:r>
+              <a:rPr lang="pt-BR" dirty="0" smtClean="0"/>
+              <a:t>*Apresenta-se;</a:t>
+            </a:r>
+          </a:p>
+          <a:p>
+            <a:r>
+              <a:rPr lang="pt-BR" dirty="0" smtClean="0"/>
+              <a:t>*Tema do trabalho de conclusão de curso;</a:t>
+            </a:r>
+          </a:p>
+          <a:p>
+            <a:r>
+              <a:rPr lang="pt-BR" dirty="0" smtClean="0"/>
+              <a:t>*Proposta;</a:t>
+            </a:r>
+          </a:p>
+          <a:p>
+            <a:r>
+              <a:rPr lang="pt-BR" dirty="0" smtClean="0"/>
+              <a:t>*O que é balanceamento de LP?;</a:t>
+            </a:r>
+          </a:p>
+          <a:p>
+            <a:r>
+              <a:rPr lang="pt-BR" dirty="0" smtClean="0"/>
+              <a:t>*Resultados</a:t>
+            </a:r>
+            <a:r>
+              <a:rPr lang="pt-BR" baseline="0" dirty="0" smtClean="0"/>
+              <a:t> esperados com o uso do software;</a:t>
+            </a:r>
+            <a:endParaRPr lang="pt-BR" dirty="0" smtClean="0"/>
+          </a:p>
+        </p:txBody>
+      </p:sp>
+      <p:sp>
+        <p:nvSpPr>
+          <p:cNvPr id="4" name="Espaço Reservado para Número de Slide 3"/>
+          <p:cNvSpPr>
+            <a:spLocks noGrp="1"/>
+          </p:cNvSpPr>
+          <p:nvPr>
+            <p:ph type="sldNum" sz="quarter" idx="10"/>
+          </p:nvPr>
+        </p:nvSpPr>
+        <p:spPr/>
+        <p:txBody>
+          <a:bodyPr/>
+          <a:lstStyle/>
+          <a:p>
+            <a:fld id="{B8C4697C-5588-4126-ACFB-A2CEC35C32B6}" type="slidenum">
+              <a:rPr lang="pt-BR" smtClean="0"/>
+              <a:t>1</a:t>
+            </a:fld>
+            <a:endParaRPr lang="pt-BR"/>
+          </a:p>
+        </p:txBody>
+      </p:sp>
+    </p:spTree>
+    <p:extLst>
+      <p:ext uri="{BB962C8B-B14F-4D97-AF65-F5344CB8AC3E}">
+        <p14:creationId xmlns:p14="http://schemas.microsoft.com/office/powerpoint/2010/main" val="2037454507"/>
+      </p:ext>
+    </p:extLst>
+  </p:cSld>
+  <p:clrMapOvr>
+    <a:masterClrMapping/>
+  </p:clrMapOvr>
+</p:notes>
+</file>
+
+<file path=ppt/notesSlides/notesSlide10.xml><?xml version="1.0" encoding="utf-8"?>
+<p:notes xmlns:a="http://schemas.openxmlformats.org/drawingml/2006/main" xmlns:r="http://schemas.openxmlformats.org/officeDocument/2006/relationships" xmlns:p="http://schemas.openxmlformats.org/presentationml/2006/main">
+  <p:cSld>
+    <p:spTree>
+      <p:nvGrpSpPr>
+        <p:cNvPr id="1" name=""/>
+        <p:cNvGrpSpPr/>
+        <p:nvPr/>
+      </p:nvGrpSpPr>
+      <p:grpSpPr>
+        <a:xfrm>
+          <a:off x="0" y="0"/>
+          <a:ext cx="0" cy="0"/>
+          <a:chOff x="0" y="0"/>
+          <a:chExt cx="0" cy="0"/>
+        </a:xfrm>
+      </p:grpSpPr>
+      <p:sp>
+        <p:nvSpPr>
+          <p:cNvPr id="2" name="Espaço Reservado para Imagem de Slide 1"/>
+          <p:cNvSpPr>
+            <a:spLocks noGrp="1" noRot="1" noChangeAspect="1"/>
+          </p:cNvSpPr>
+          <p:nvPr>
+            <p:ph type="sldImg"/>
+          </p:nvPr>
+        </p:nvSpPr>
+        <p:spPr/>
+      </p:sp>
+      <p:sp>
+        <p:nvSpPr>
+          <p:cNvPr id="3" name="Espaço Reservado para Anotações 2"/>
+          <p:cNvSpPr>
+            <a:spLocks noGrp="1"/>
+          </p:cNvSpPr>
+          <p:nvPr>
+            <p:ph type="body" idx="1"/>
+          </p:nvPr>
+        </p:nvSpPr>
+        <p:spPr/>
+        <p:txBody>
+          <a:bodyPr/>
+          <a:lstStyle/>
+          <a:p>
+            <a:pPr marL="171450" indent="-171450">
+              <a:buFont typeface="Arial" panose="020B0604020202020204" pitchFamily="34" charset="0"/>
+              <a:buChar char="•"/>
+            </a:pPr>
+            <a:r>
+              <a:rPr lang="pt-BR" sz="1200" kern="1200" dirty="0" smtClean="0">
+                <a:solidFill>
+                  <a:schemeClr val="tx1"/>
+                </a:solidFill>
+                <a:effectLst/>
+                <a:latin typeface="+mn-lt"/>
+                <a:ea typeface="+mn-ea"/>
+                <a:cs typeface="+mn-cs"/>
+              </a:rPr>
+              <a:t>Para que se atinja os objetivos almejados, este trabalho foi considerado em cooperação com o projeto de iniciação científica ...</a:t>
+            </a:r>
+            <a:endParaRPr lang="pt-BR" dirty="0" smtClean="0"/>
+          </a:p>
+          <a:p>
+            <a:pPr marL="171450" indent="-171450">
+              <a:buFont typeface="Arial" panose="020B0604020202020204" pitchFamily="34" charset="0"/>
+              <a:buChar char="•"/>
+            </a:pPr>
+            <a:r>
+              <a:rPr lang="pt-BR" dirty="0" smtClean="0"/>
+              <a:t>20 interfaces;</a:t>
+            </a:r>
+            <a:endParaRPr lang="pt-BR" dirty="0"/>
+          </a:p>
+        </p:txBody>
+      </p:sp>
+      <p:sp>
+        <p:nvSpPr>
+          <p:cNvPr id="4" name="Espaço Reservado para Número de Slide 3"/>
+          <p:cNvSpPr>
+            <a:spLocks noGrp="1"/>
+          </p:cNvSpPr>
+          <p:nvPr>
+            <p:ph type="sldNum" sz="quarter" idx="10"/>
+          </p:nvPr>
+        </p:nvSpPr>
+        <p:spPr/>
+        <p:txBody>
+          <a:bodyPr/>
+          <a:lstStyle/>
+          <a:p>
+            <a:fld id="{B8C4697C-5588-4126-ACFB-A2CEC35C32B6}" type="slidenum">
+              <a:rPr lang="pt-BR" smtClean="0"/>
+              <a:t>12</a:t>
+            </a:fld>
+            <a:endParaRPr lang="pt-BR"/>
+          </a:p>
+        </p:txBody>
+      </p:sp>
+    </p:spTree>
+    <p:extLst>
+      <p:ext uri="{BB962C8B-B14F-4D97-AF65-F5344CB8AC3E}">
+        <p14:creationId xmlns:p14="http://schemas.microsoft.com/office/powerpoint/2010/main" val="2650552171"/>
+      </p:ext>
+    </p:extLst>
+  </p:cSld>
+  <p:clrMapOvr>
+    <a:masterClrMapping/>
+  </p:clrMapOvr>
+</p:notes>
+</file>
+
+<file path=ppt/notesSlides/notesSlide2.xml><?xml version="1.0" encoding="utf-8"?>
+<p:notes xmlns:a="http://schemas.openxmlformats.org/drawingml/2006/main" xmlns:r="http://schemas.openxmlformats.org/officeDocument/2006/relationships" xmlns:p="http://schemas.openxmlformats.org/presentationml/2006/main">
+  <p:cSld>
+    <p:spTree>
+      <p:nvGrpSpPr>
+        <p:cNvPr id="1" name=""/>
+        <p:cNvGrpSpPr/>
+        <p:nvPr/>
+      </p:nvGrpSpPr>
+      <p:grpSpPr>
+        <a:xfrm>
+          <a:off x="0" y="0"/>
+          <a:ext cx="0" cy="0"/>
+          <a:chOff x="0" y="0"/>
+          <a:chExt cx="0" cy="0"/>
+        </a:xfrm>
+      </p:grpSpPr>
+      <p:sp>
+        <p:nvSpPr>
+          <p:cNvPr id="2" name="Espaço Reservado para Imagem de Slide 1"/>
+          <p:cNvSpPr>
+            <a:spLocks noGrp="1" noRot="1" noChangeAspect="1"/>
+          </p:cNvSpPr>
+          <p:nvPr>
+            <p:ph type="sldImg"/>
+          </p:nvPr>
+        </p:nvSpPr>
+        <p:spPr/>
+      </p:sp>
+      <p:sp>
+        <p:nvSpPr>
+          <p:cNvPr id="3" name="Espaço Reservado para Anotações 2"/>
+          <p:cNvSpPr>
+            <a:spLocks noGrp="1"/>
+          </p:cNvSpPr>
+          <p:nvPr>
+            <p:ph type="body" idx="1"/>
+          </p:nvPr>
+        </p:nvSpPr>
+        <p:spPr/>
+        <p:txBody>
+          <a:bodyPr/>
+          <a:lstStyle/>
+          <a:p>
+            <a:r>
+              <a:rPr lang="pt-BR" dirty="0" smtClean="0"/>
+              <a:t>*IC sofrendo de forma </a:t>
+            </a:r>
+            <a:r>
+              <a:rPr lang="pt-BR" b="1" dirty="0" smtClean="0"/>
+              <a:t>intensa os impactos </a:t>
+            </a:r>
+            <a:r>
+              <a:rPr lang="pt-BR" dirty="0" smtClean="0"/>
+              <a:t>da concorrência</a:t>
+            </a:r>
+            <a:r>
+              <a:rPr lang="pt-BR" baseline="0" dirty="0" smtClean="0"/>
+              <a:t> com o </a:t>
+            </a:r>
+            <a:r>
+              <a:rPr lang="pt-BR" b="1" baseline="0" dirty="0" smtClean="0"/>
+              <a:t>mercado externo</a:t>
+            </a:r>
+            <a:r>
+              <a:rPr lang="pt-BR" baseline="0" dirty="0" smtClean="0"/>
+              <a:t>;</a:t>
+            </a:r>
+            <a:endParaRPr lang="pt-BR" dirty="0"/>
+          </a:p>
+        </p:txBody>
+      </p:sp>
+      <p:sp>
+        <p:nvSpPr>
+          <p:cNvPr id="4" name="Espaço Reservado para Número de Slide 3"/>
+          <p:cNvSpPr>
+            <a:spLocks noGrp="1"/>
+          </p:cNvSpPr>
+          <p:nvPr>
+            <p:ph type="sldNum" sz="quarter" idx="10"/>
+          </p:nvPr>
+        </p:nvSpPr>
+        <p:spPr/>
+        <p:txBody>
+          <a:bodyPr/>
+          <a:lstStyle/>
+          <a:p>
+            <a:fld id="{B8C4697C-5588-4126-ACFB-A2CEC35C32B6}" type="slidenum">
+              <a:rPr lang="pt-BR" smtClean="0"/>
+              <a:t>2</a:t>
+            </a:fld>
+            <a:endParaRPr lang="pt-BR"/>
+          </a:p>
+        </p:txBody>
+      </p:sp>
+    </p:spTree>
+    <p:extLst>
+      <p:ext uri="{BB962C8B-B14F-4D97-AF65-F5344CB8AC3E}">
+        <p14:creationId xmlns:p14="http://schemas.microsoft.com/office/powerpoint/2010/main" val="1429639105"/>
+      </p:ext>
+    </p:extLst>
+  </p:cSld>
+  <p:clrMapOvr>
+    <a:masterClrMapping/>
+  </p:clrMapOvr>
+</p:notes>
+</file>
+
+<file path=ppt/notesSlides/notesSlide3.xml><?xml version="1.0" encoding="utf-8"?>
+<p:notes xmlns:a="http://schemas.openxmlformats.org/drawingml/2006/main" xmlns:r="http://schemas.openxmlformats.org/officeDocument/2006/relationships" xmlns:p="http://schemas.openxmlformats.org/presentationml/2006/main">
+  <p:cSld>
+    <p:spTree>
+      <p:nvGrpSpPr>
+        <p:cNvPr id="1" name=""/>
+        <p:cNvGrpSpPr/>
+        <p:nvPr/>
+      </p:nvGrpSpPr>
+      <p:grpSpPr>
+        <a:xfrm>
+          <a:off x="0" y="0"/>
+          <a:ext cx="0" cy="0"/>
+          <a:chOff x="0" y="0"/>
+          <a:chExt cx="0" cy="0"/>
+        </a:xfrm>
+      </p:grpSpPr>
+      <p:sp>
+        <p:nvSpPr>
+          <p:cNvPr id="2" name="Espaço Reservado para Imagem de Slide 1"/>
+          <p:cNvSpPr>
+            <a:spLocks noGrp="1" noRot="1" noChangeAspect="1"/>
+          </p:cNvSpPr>
+          <p:nvPr>
+            <p:ph type="sldImg"/>
+          </p:nvPr>
+        </p:nvSpPr>
+        <p:spPr/>
+      </p:sp>
+      <p:sp>
+        <p:nvSpPr>
+          <p:cNvPr id="3" name="Espaço Reservado para Anotações 2"/>
+          <p:cNvSpPr>
+            <a:spLocks noGrp="1"/>
+          </p:cNvSpPr>
+          <p:nvPr>
+            <p:ph type="body" idx="1"/>
+          </p:nvPr>
+        </p:nvSpPr>
+        <p:spPr/>
+        <p:txBody>
+          <a:bodyPr/>
+          <a:lstStyle/>
+          <a:p>
+            <a:r>
+              <a:rPr lang="pt-BR" dirty="0" smtClean="0"/>
+              <a:t>*Modernização do setor com investimentos em tecnologia = saída para a sobrevivência da IC;</a:t>
+            </a:r>
+          </a:p>
+          <a:p>
+            <a:r>
+              <a:rPr lang="pt-BR" dirty="0" smtClean="0"/>
+              <a:t>*Necessidade de desenvolver</a:t>
+            </a:r>
+            <a:r>
+              <a:rPr lang="pt-BR" baseline="0" dirty="0" smtClean="0"/>
+              <a:t> recursos tecnológicos como o software proposto;</a:t>
+            </a:r>
+            <a:endParaRPr lang="pt-BR" dirty="0"/>
+          </a:p>
+        </p:txBody>
+      </p:sp>
+      <p:sp>
+        <p:nvSpPr>
+          <p:cNvPr id="4" name="Espaço Reservado para Número de Slide 3"/>
+          <p:cNvSpPr>
+            <a:spLocks noGrp="1"/>
+          </p:cNvSpPr>
+          <p:nvPr>
+            <p:ph type="sldNum" sz="quarter" idx="10"/>
+          </p:nvPr>
+        </p:nvSpPr>
+        <p:spPr/>
+        <p:txBody>
+          <a:bodyPr/>
+          <a:lstStyle/>
+          <a:p>
+            <a:fld id="{B8C4697C-5588-4126-ACFB-A2CEC35C32B6}" type="slidenum">
+              <a:rPr lang="pt-BR" smtClean="0"/>
+              <a:t>3</a:t>
+            </a:fld>
+            <a:endParaRPr lang="pt-BR"/>
+          </a:p>
+        </p:txBody>
+      </p:sp>
+    </p:spTree>
+    <p:extLst>
+      <p:ext uri="{BB962C8B-B14F-4D97-AF65-F5344CB8AC3E}">
+        <p14:creationId xmlns:p14="http://schemas.microsoft.com/office/powerpoint/2010/main" val="1413887343"/>
+      </p:ext>
+    </p:extLst>
+  </p:cSld>
+  <p:clrMapOvr>
+    <a:masterClrMapping/>
+  </p:clrMapOvr>
+</p:notes>
+</file>
+
+<file path=ppt/notesSlides/notesSlide4.xml><?xml version="1.0" encoding="utf-8"?>
+<p:notes xmlns:a="http://schemas.openxmlformats.org/drawingml/2006/main" xmlns:r="http://schemas.openxmlformats.org/officeDocument/2006/relationships" xmlns:p="http://schemas.openxmlformats.org/presentationml/2006/main">
+  <p:cSld>
+    <p:spTree>
+      <p:nvGrpSpPr>
+        <p:cNvPr id="1" name=""/>
+        <p:cNvGrpSpPr/>
+        <p:nvPr/>
+      </p:nvGrpSpPr>
+      <p:grpSpPr>
+        <a:xfrm>
+          <a:off x="0" y="0"/>
+          <a:ext cx="0" cy="0"/>
+          <a:chOff x="0" y="0"/>
+          <a:chExt cx="0" cy="0"/>
+        </a:xfrm>
+      </p:grpSpPr>
+      <p:sp>
+        <p:nvSpPr>
+          <p:cNvPr id="2" name="Espaço Reservado para Imagem de Slide 1"/>
+          <p:cNvSpPr>
+            <a:spLocks noGrp="1" noRot="1" noChangeAspect="1"/>
+          </p:cNvSpPr>
+          <p:nvPr>
+            <p:ph type="sldImg"/>
+          </p:nvPr>
+        </p:nvSpPr>
+        <p:spPr/>
+      </p:sp>
+      <p:sp>
+        <p:nvSpPr>
+          <p:cNvPr id="3" name="Espaço Reservado para Anotações 2"/>
+          <p:cNvSpPr>
+            <a:spLocks noGrp="1"/>
+          </p:cNvSpPr>
+          <p:nvPr>
+            <p:ph type="body" idx="1"/>
+          </p:nvPr>
+        </p:nvSpPr>
+        <p:spPr/>
+        <p:txBody>
+          <a:bodyPr/>
+          <a:lstStyle/>
+          <a:p>
+            <a:pPr marL="171450" indent="-171450">
+              <a:buFont typeface="Arial" panose="020B0604020202020204" pitchFamily="34" charset="0"/>
+              <a:buChar char="•"/>
+            </a:pPr>
+            <a:r>
+              <a:rPr lang="pt-BR" dirty="0" smtClean="0"/>
+              <a:t>P. </a:t>
+            </a:r>
+            <a:r>
+              <a:rPr lang="pt-BR" dirty="0" err="1" smtClean="0"/>
+              <a:t>Bibliografica</a:t>
+            </a:r>
+            <a:r>
+              <a:rPr lang="pt-BR" dirty="0" smtClean="0"/>
+              <a:t> = Principais autores: </a:t>
+            </a:r>
+            <a:r>
+              <a:rPr lang="pt-BR" dirty="0" err="1" smtClean="0"/>
+              <a:t>Tubino</a:t>
+            </a:r>
+            <a:r>
+              <a:rPr lang="pt-BR" dirty="0" smtClean="0"/>
+              <a:t>, slack, </a:t>
+            </a:r>
+            <a:r>
+              <a:rPr lang="pt-BR" dirty="0" err="1" smtClean="0"/>
+              <a:t>Graeml</a:t>
+            </a:r>
+            <a:r>
+              <a:rPr lang="pt-BR" dirty="0" smtClean="0"/>
+              <a:t> e Peinado;</a:t>
+            </a:r>
+          </a:p>
+          <a:p>
+            <a:pPr marL="171450" indent="-171450">
+              <a:buFont typeface="Arial" panose="020B0604020202020204" pitchFamily="34" charset="0"/>
+              <a:buChar char="•"/>
+            </a:pPr>
+            <a:r>
+              <a:rPr lang="pt-BR" dirty="0" smtClean="0"/>
+              <a:t>P. Qualitativa = Entrevista a </a:t>
+            </a:r>
+            <a:r>
+              <a:rPr lang="pt-BR" b="1" dirty="0" err="1" smtClean="0"/>
+              <a:t>Cronometrista</a:t>
+            </a:r>
+            <a:r>
+              <a:rPr lang="pt-BR" dirty="0" smtClean="0"/>
+              <a:t>, </a:t>
+            </a:r>
+            <a:r>
+              <a:rPr lang="pt-BR" b="1" dirty="0" smtClean="0"/>
+              <a:t>Profissionais</a:t>
+            </a:r>
+            <a:r>
+              <a:rPr lang="pt-BR" b="1" baseline="0" dirty="0" smtClean="0"/>
+              <a:t> de distribuição </a:t>
+            </a:r>
+            <a:r>
+              <a:rPr lang="pt-BR" baseline="0" dirty="0" smtClean="0"/>
+              <a:t>de produção e </a:t>
+            </a:r>
+            <a:r>
+              <a:rPr lang="pt-BR" b="1" baseline="0" dirty="0" smtClean="0"/>
+              <a:t>Gerente de produção</a:t>
+            </a:r>
+            <a:r>
+              <a:rPr lang="pt-BR" baseline="0" dirty="0" smtClean="0"/>
+              <a:t>;</a:t>
+            </a:r>
+          </a:p>
+          <a:p>
+            <a:pPr marL="171450" indent="-171450">
+              <a:buFont typeface="Arial" panose="020B0604020202020204" pitchFamily="34" charset="0"/>
+              <a:buChar char="•"/>
+            </a:pPr>
+            <a:r>
+              <a:rPr lang="pt-BR" baseline="0" dirty="0" smtClean="0"/>
+              <a:t>P. de Campo = </a:t>
+            </a:r>
+            <a:r>
+              <a:rPr lang="pt-BR" b="1" baseline="0" dirty="0" smtClean="0"/>
+              <a:t>Acompanhamento da rotina</a:t>
+            </a:r>
+            <a:r>
+              <a:rPr lang="pt-BR" baseline="0" dirty="0" smtClean="0"/>
+              <a:t> dos trabalhadores na fábrica;</a:t>
+            </a:r>
+            <a:endParaRPr lang="pt-BR" dirty="0"/>
+          </a:p>
+        </p:txBody>
+      </p:sp>
+      <p:sp>
+        <p:nvSpPr>
+          <p:cNvPr id="4" name="Espaço Reservado para Número de Slide 3"/>
+          <p:cNvSpPr>
+            <a:spLocks noGrp="1"/>
+          </p:cNvSpPr>
+          <p:nvPr>
+            <p:ph type="sldNum" sz="quarter" idx="10"/>
+          </p:nvPr>
+        </p:nvSpPr>
+        <p:spPr/>
+        <p:txBody>
+          <a:bodyPr/>
+          <a:lstStyle/>
+          <a:p>
+            <a:fld id="{B8C4697C-5588-4126-ACFB-A2CEC35C32B6}" type="slidenum">
+              <a:rPr lang="pt-BR" smtClean="0"/>
+              <a:t>4</a:t>
+            </a:fld>
+            <a:endParaRPr lang="pt-BR"/>
+          </a:p>
+        </p:txBody>
+      </p:sp>
+    </p:spTree>
+    <p:extLst>
+      <p:ext uri="{BB962C8B-B14F-4D97-AF65-F5344CB8AC3E}">
+        <p14:creationId xmlns:p14="http://schemas.microsoft.com/office/powerpoint/2010/main" val="3793601869"/>
+      </p:ext>
+    </p:extLst>
+  </p:cSld>
+  <p:clrMapOvr>
+    <a:masterClrMapping/>
+  </p:clrMapOvr>
+</p:notes>
+</file>
+
+<file path=ppt/notesSlides/notesSlide5.xml><?xml version="1.0" encoding="utf-8"?>
+<p:notes xmlns:a="http://schemas.openxmlformats.org/drawingml/2006/main" xmlns:r="http://schemas.openxmlformats.org/officeDocument/2006/relationships" xmlns:p="http://schemas.openxmlformats.org/presentationml/2006/main">
+  <p:cSld>
+    <p:spTree>
+      <p:nvGrpSpPr>
+        <p:cNvPr id="1" name=""/>
+        <p:cNvGrpSpPr/>
+        <p:nvPr/>
+      </p:nvGrpSpPr>
+      <p:grpSpPr>
+        <a:xfrm>
+          <a:off x="0" y="0"/>
+          <a:ext cx="0" cy="0"/>
+          <a:chOff x="0" y="0"/>
+          <a:chExt cx="0" cy="0"/>
+        </a:xfrm>
+      </p:grpSpPr>
+      <p:sp>
+        <p:nvSpPr>
+          <p:cNvPr id="2" name="Espaço Reservado para Imagem de Slide 1"/>
+          <p:cNvSpPr>
+            <a:spLocks noGrp="1" noRot="1" noChangeAspect="1"/>
+          </p:cNvSpPr>
+          <p:nvPr>
+            <p:ph type="sldImg"/>
+          </p:nvPr>
+        </p:nvSpPr>
+        <p:spPr/>
+      </p:sp>
+      <p:sp>
+        <p:nvSpPr>
+          <p:cNvPr id="3" name="Espaço Reservado para Anotações 2"/>
+          <p:cNvSpPr>
+            <a:spLocks noGrp="1"/>
+          </p:cNvSpPr>
+          <p:nvPr>
+            <p:ph type="body" idx="1"/>
+          </p:nvPr>
+        </p:nvSpPr>
+        <p:spPr/>
+        <p:txBody>
+          <a:bodyPr/>
+          <a:lstStyle/>
+          <a:p>
+            <a:r>
+              <a:rPr lang="pt-BR" dirty="0" smtClean="0"/>
+              <a:t>Com base nas informações levantadas</a:t>
+            </a:r>
+            <a:r>
+              <a:rPr lang="pt-BR" baseline="0" dirty="0" smtClean="0"/>
+              <a:t> </a:t>
+            </a:r>
+            <a:r>
+              <a:rPr lang="pt-BR" b="1" baseline="0" dirty="0" smtClean="0"/>
+              <a:t>será apresentado </a:t>
+            </a:r>
+            <a:r>
+              <a:rPr lang="pt-BR" baseline="0" dirty="0" smtClean="0"/>
+              <a:t>agora uma </a:t>
+            </a:r>
+            <a:r>
+              <a:rPr lang="pt-BR" b="1" baseline="0" dirty="0" smtClean="0"/>
+              <a:t>síntese da pesquisa</a:t>
+            </a:r>
+            <a:r>
+              <a:rPr lang="pt-BR" baseline="0" dirty="0" smtClean="0"/>
+              <a:t>;</a:t>
+            </a:r>
+            <a:endParaRPr lang="pt-BR" dirty="0"/>
+          </a:p>
+        </p:txBody>
+      </p:sp>
+      <p:sp>
+        <p:nvSpPr>
+          <p:cNvPr id="4" name="Espaço Reservado para Número de Slide 3"/>
+          <p:cNvSpPr>
+            <a:spLocks noGrp="1"/>
+          </p:cNvSpPr>
+          <p:nvPr>
+            <p:ph type="sldNum" sz="quarter" idx="10"/>
+          </p:nvPr>
+        </p:nvSpPr>
+        <p:spPr/>
+        <p:txBody>
+          <a:bodyPr/>
+          <a:lstStyle/>
+          <a:p>
+            <a:fld id="{B8C4697C-5588-4126-ACFB-A2CEC35C32B6}" type="slidenum">
+              <a:rPr lang="pt-BR" smtClean="0"/>
+              <a:t>5</a:t>
+            </a:fld>
+            <a:endParaRPr lang="pt-BR"/>
+          </a:p>
+        </p:txBody>
+      </p:sp>
+    </p:spTree>
+    <p:extLst>
+      <p:ext uri="{BB962C8B-B14F-4D97-AF65-F5344CB8AC3E}">
+        <p14:creationId xmlns:p14="http://schemas.microsoft.com/office/powerpoint/2010/main" val="4200091322"/>
+      </p:ext>
+    </p:extLst>
+  </p:cSld>
+  <p:clrMapOvr>
+    <a:masterClrMapping/>
+  </p:clrMapOvr>
+</p:notes>
+</file>
+
+<file path=ppt/notesSlides/notesSlide6.xml><?xml version="1.0" encoding="utf-8"?>
+<p:notes xmlns:a="http://schemas.openxmlformats.org/drawingml/2006/main" xmlns:r="http://schemas.openxmlformats.org/officeDocument/2006/relationships" xmlns:p="http://schemas.openxmlformats.org/presentationml/2006/main">
+  <p:cSld>
+    <p:spTree>
+      <p:nvGrpSpPr>
+        <p:cNvPr id="1" name=""/>
+        <p:cNvGrpSpPr/>
+        <p:nvPr/>
+      </p:nvGrpSpPr>
+      <p:grpSpPr>
+        <a:xfrm>
+          <a:off x="0" y="0"/>
+          <a:ext cx="0" cy="0"/>
+          <a:chOff x="0" y="0"/>
+          <a:chExt cx="0" cy="0"/>
+        </a:xfrm>
+      </p:grpSpPr>
+      <p:sp>
+        <p:nvSpPr>
+          <p:cNvPr id="2" name="Espaço Reservado para Imagem de Slide 1"/>
+          <p:cNvSpPr>
+            <a:spLocks noGrp="1" noRot="1" noChangeAspect="1"/>
+          </p:cNvSpPr>
+          <p:nvPr>
+            <p:ph type="sldImg"/>
+          </p:nvPr>
+        </p:nvSpPr>
+        <p:spPr/>
+      </p:sp>
+      <p:sp>
+        <p:nvSpPr>
+          <p:cNvPr id="3" name="Espaço Reservado para Anotações 2"/>
+          <p:cNvSpPr>
+            <a:spLocks noGrp="1"/>
+          </p:cNvSpPr>
+          <p:nvPr>
+            <p:ph type="body" idx="1"/>
+          </p:nvPr>
+        </p:nvSpPr>
+        <p:spPr/>
+        <p:txBody>
+          <a:bodyPr/>
+          <a:lstStyle/>
+          <a:p>
+            <a:pPr marL="171450" indent="-171450">
+              <a:buFont typeface="Arial" panose="020B0604020202020204" pitchFamily="34" charset="0"/>
+              <a:buChar char="•"/>
+            </a:pPr>
+            <a:r>
+              <a:rPr lang="pt-BR" dirty="0" smtClean="0"/>
+              <a:t>O que é uma Linha de Produção?</a:t>
+            </a:r>
+            <a:endParaRPr lang="pt-BR" dirty="0"/>
+          </a:p>
+        </p:txBody>
+      </p:sp>
+      <p:sp>
+        <p:nvSpPr>
+          <p:cNvPr id="4" name="Espaço Reservado para Número de Slide 3"/>
+          <p:cNvSpPr>
+            <a:spLocks noGrp="1"/>
+          </p:cNvSpPr>
+          <p:nvPr>
+            <p:ph type="sldNum" sz="quarter" idx="10"/>
+          </p:nvPr>
+        </p:nvSpPr>
+        <p:spPr/>
+        <p:txBody>
+          <a:bodyPr/>
+          <a:lstStyle/>
+          <a:p>
+            <a:fld id="{B8C4697C-5588-4126-ACFB-A2CEC35C32B6}" type="slidenum">
+              <a:rPr lang="pt-BR" smtClean="0"/>
+              <a:t>6</a:t>
+            </a:fld>
+            <a:endParaRPr lang="pt-BR"/>
+          </a:p>
+        </p:txBody>
+      </p:sp>
+    </p:spTree>
+    <p:extLst>
+      <p:ext uri="{BB962C8B-B14F-4D97-AF65-F5344CB8AC3E}">
+        <p14:creationId xmlns:p14="http://schemas.microsoft.com/office/powerpoint/2010/main" val="3962948119"/>
+      </p:ext>
+    </p:extLst>
+  </p:cSld>
+  <p:clrMapOvr>
+    <a:masterClrMapping/>
+  </p:clrMapOvr>
+</p:notes>
+</file>
+
+<file path=ppt/notesSlides/notesSlide7.xml><?xml version="1.0" encoding="utf-8"?>
+<p:notes xmlns:a="http://schemas.openxmlformats.org/drawingml/2006/main" xmlns:r="http://schemas.openxmlformats.org/officeDocument/2006/relationships" xmlns:p="http://schemas.openxmlformats.org/presentationml/2006/main">
+  <p:cSld>
+    <p:spTree>
+      <p:nvGrpSpPr>
+        <p:cNvPr id="1" name=""/>
+        <p:cNvGrpSpPr/>
+        <p:nvPr/>
+      </p:nvGrpSpPr>
+      <p:grpSpPr>
+        <a:xfrm>
+          <a:off x="0" y="0"/>
+          <a:ext cx="0" cy="0"/>
+          <a:chOff x="0" y="0"/>
+          <a:chExt cx="0" cy="0"/>
+        </a:xfrm>
+      </p:grpSpPr>
+      <p:sp>
+        <p:nvSpPr>
+          <p:cNvPr id="2" name="Espaço Reservado para Imagem de Slide 1"/>
+          <p:cNvSpPr>
+            <a:spLocks noGrp="1" noRot="1" noChangeAspect="1"/>
+          </p:cNvSpPr>
+          <p:nvPr>
+            <p:ph type="sldImg"/>
+          </p:nvPr>
+        </p:nvSpPr>
+        <p:spPr/>
+      </p:sp>
+      <p:sp>
+        <p:nvSpPr>
+          <p:cNvPr id="3" name="Espaço Reservado para Anotações 2"/>
+          <p:cNvSpPr>
+            <a:spLocks noGrp="1"/>
+          </p:cNvSpPr>
+          <p:nvPr>
+            <p:ph type="body" idx="1"/>
+          </p:nvPr>
+        </p:nvSpPr>
+        <p:spPr/>
+        <p:txBody>
+          <a:bodyPr/>
+          <a:lstStyle/>
+          <a:p>
+            <a:pPr marL="171450" indent="-171450">
+              <a:buFont typeface="Arial" panose="020B0604020202020204" pitchFamily="34" charset="0"/>
+              <a:buChar char="•"/>
+            </a:pPr>
+            <a:r>
+              <a:rPr lang="pt-BR" dirty="0" smtClean="0"/>
+              <a:t>Falar sobre a figura;</a:t>
+            </a:r>
+            <a:endParaRPr lang="pt-BR" dirty="0"/>
+          </a:p>
+        </p:txBody>
+      </p:sp>
+      <p:sp>
+        <p:nvSpPr>
+          <p:cNvPr id="4" name="Espaço Reservado para Número de Slide 3"/>
+          <p:cNvSpPr>
+            <a:spLocks noGrp="1"/>
+          </p:cNvSpPr>
+          <p:nvPr>
+            <p:ph type="sldNum" sz="quarter" idx="10"/>
+          </p:nvPr>
+        </p:nvSpPr>
+        <p:spPr/>
+        <p:txBody>
+          <a:bodyPr/>
+          <a:lstStyle/>
+          <a:p>
+            <a:fld id="{B8C4697C-5588-4126-ACFB-A2CEC35C32B6}" type="slidenum">
+              <a:rPr lang="pt-BR" smtClean="0"/>
+              <a:t>7</a:t>
+            </a:fld>
+            <a:endParaRPr lang="pt-BR"/>
+          </a:p>
+        </p:txBody>
+      </p:sp>
+    </p:spTree>
+    <p:extLst>
+      <p:ext uri="{BB962C8B-B14F-4D97-AF65-F5344CB8AC3E}">
+        <p14:creationId xmlns:p14="http://schemas.microsoft.com/office/powerpoint/2010/main" val="2939008759"/>
+      </p:ext>
+    </p:extLst>
+  </p:cSld>
+  <p:clrMapOvr>
+    <a:masterClrMapping/>
+  </p:clrMapOvr>
+</p:notes>
+</file>
+
+<file path=ppt/notesSlides/notesSlide8.xml><?xml version="1.0" encoding="utf-8"?>
+<p:notes xmlns:a="http://schemas.openxmlformats.org/drawingml/2006/main" xmlns:r="http://schemas.openxmlformats.org/officeDocument/2006/relationships" xmlns:p="http://schemas.openxmlformats.org/presentationml/2006/main">
+  <p:cSld>
+    <p:spTree>
+      <p:nvGrpSpPr>
+        <p:cNvPr id="1" name=""/>
+        <p:cNvGrpSpPr/>
+        <p:nvPr/>
+      </p:nvGrpSpPr>
+      <p:grpSpPr>
+        <a:xfrm>
+          <a:off x="0" y="0"/>
+          <a:ext cx="0" cy="0"/>
+          <a:chOff x="0" y="0"/>
+          <a:chExt cx="0" cy="0"/>
+        </a:xfrm>
+      </p:grpSpPr>
+      <p:sp>
+        <p:nvSpPr>
+          <p:cNvPr id="2" name="Espaço Reservado para Imagem de Slide 1"/>
+          <p:cNvSpPr>
+            <a:spLocks noGrp="1" noRot="1" noChangeAspect="1"/>
+          </p:cNvSpPr>
+          <p:nvPr>
+            <p:ph type="sldImg"/>
+          </p:nvPr>
+        </p:nvSpPr>
+        <p:spPr/>
+      </p:sp>
+      <p:sp>
+        <p:nvSpPr>
+          <p:cNvPr id="3" name="Espaço Reservado para Anotações 2"/>
+          <p:cNvSpPr>
+            <a:spLocks noGrp="1"/>
+          </p:cNvSpPr>
+          <p:nvPr>
+            <p:ph type="body" idx="1"/>
+          </p:nvPr>
+        </p:nvSpPr>
+        <p:spPr/>
+        <p:txBody>
+          <a:bodyPr/>
+          <a:lstStyle/>
+          <a:p>
+            <a:pPr marL="171450" indent="-171450">
+              <a:buFont typeface="Arial" panose="020B0604020202020204" pitchFamily="34" charset="0"/>
+              <a:buChar char="•"/>
+            </a:pPr>
+            <a:r>
+              <a:rPr lang="pt-BR" dirty="0" smtClean="0"/>
+              <a:t>Na Tiragem de tempos =</a:t>
+            </a:r>
+            <a:r>
+              <a:rPr lang="pt-BR" baseline="0" dirty="0" smtClean="0"/>
+              <a:t> mede intervalo de tempo entre o inicio e o fim de uma operação. Em média </a:t>
+            </a:r>
+            <a:r>
+              <a:rPr lang="pt-BR" b="1" baseline="0" dirty="0" smtClean="0"/>
+              <a:t>10 vezes</a:t>
+            </a:r>
+            <a:r>
+              <a:rPr lang="pt-BR" baseline="0" dirty="0" smtClean="0"/>
+              <a:t>, usa-se a </a:t>
+            </a:r>
+            <a:r>
+              <a:rPr lang="pt-BR" b="1" baseline="0" dirty="0" smtClean="0"/>
+              <a:t>media dos tempos</a:t>
+            </a:r>
+            <a:r>
+              <a:rPr lang="pt-BR" baseline="0" dirty="0" smtClean="0"/>
+              <a:t>;</a:t>
+            </a:r>
+            <a:endParaRPr lang="pt-BR" dirty="0"/>
+          </a:p>
+        </p:txBody>
+      </p:sp>
+      <p:sp>
+        <p:nvSpPr>
+          <p:cNvPr id="4" name="Espaço Reservado para Número de Slide 3"/>
+          <p:cNvSpPr>
+            <a:spLocks noGrp="1"/>
+          </p:cNvSpPr>
+          <p:nvPr>
+            <p:ph type="sldNum" sz="quarter" idx="10"/>
+          </p:nvPr>
+        </p:nvSpPr>
+        <p:spPr/>
+        <p:txBody>
+          <a:bodyPr/>
+          <a:lstStyle/>
+          <a:p>
+            <a:fld id="{B8C4697C-5588-4126-ACFB-A2CEC35C32B6}" type="slidenum">
+              <a:rPr lang="pt-BR" smtClean="0"/>
+              <a:t>8</a:t>
+            </a:fld>
+            <a:endParaRPr lang="pt-BR"/>
+          </a:p>
+        </p:txBody>
+      </p:sp>
+    </p:spTree>
+    <p:extLst>
+      <p:ext uri="{BB962C8B-B14F-4D97-AF65-F5344CB8AC3E}">
+        <p14:creationId xmlns:p14="http://schemas.microsoft.com/office/powerpoint/2010/main" val="4018168762"/>
+      </p:ext>
+    </p:extLst>
+  </p:cSld>
+  <p:clrMapOvr>
+    <a:masterClrMapping/>
+  </p:clrMapOvr>
+</p:notes>
+</file>
+
+<file path=ppt/notesSlides/notesSlide9.xml><?xml version="1.0" encoding="utf-8"?>
+<p:notes xmlns:a="http://schemas.openxmlformats.org/drawingml/2006/main" xmlns:r="http://schemas.openxmlformats.org/officeDocument/2006/relationships" xmlns:p="http://schemas.openxmlformats.org/presentationml/2006/main">
+  <p:cSld>
+    <p:spTree>
+      <p:nvGrpSpPr>
+        <p:cNvPr id="1" name=""/>
+        <p:cNvGrpSpPr/>
+        <p:nvPr/>
+      </p:nvGrpSpPr>
+      <p:grpSpPr>
+        <a:xfrm>
+          <a:off x="0" y="0"/>
+          <a:ext cx="0" cy="0"/>
+          <a:chOff x="0" y="0"/>
+          <a:chExt cx="0" cy="0"/>
+        </a:xfrm>
+      </p:grpSpPr>
+      <p:sp>
+        <p:nvSpPr>
+          <p:cNvPr id="2" name="Espaço Reservado para Imagem de Slide 1"/>
+          <p:cNvSpPr>
+            <a:spLocks noGrp="1" noRot="1" noChangeAspect="1"/>
+          </p:cNvSpPr>
+          <p:nvPr>
+            <p:ph type="sldImg"/>
+          </p:nvPr>
+        </p:nvSpPr>
+        <p:spPr/>
+      </p:sp>
+      <p:sp>
+        <p:nvSpPr>
+          <p:cNvPr id="3" name="Espaço Reservado para Anotações 2"/>
+          <p:cNvSpPr>
+            <a:spLocks noGrp="1"/>
+          </p:cNvSpPr>
+          <p:nvPr>
+            <p:ph type="body" idx="1"/>
+          </p:nvPr>
+        </p:nvSpPr>
+        <p:spPr/>
+        <p:txBody>
+          <a:bodyPr/>
+          <a:lstStyle/>
+          <a:p>
+            <a:pPr marL="171450" indent="-171450">
+              <a:buFont typeface="Arial" panose="020B0604020202020204" pitchFamily="34" charset="0"/>
+              <a:buChar char="•"/>
+            </a:pPr>
+            <a:r>
+              <a:rPr lang="pt-BR" dirty="0" smtClean="0"/>
+              <a:t>A</a:t>
+            </a:r>
+            <a:r>
+              <a:rPr lang="pt-BR" b="1" dirty="0" smtClean="0"/>
+              <a:t> Proposta</a:t>
+            </a:r>
+            <a:r>
+              <a:rPr lang="pt-BR" dirty="0" smtClean="0"/>
+              <a:t> desse trabalho foi desenvolver um </a:t>
+            </a:r>
+            <a:r>
+              <a:rPr lang="pt-BR" b="1" dirty="0" smtClean="0"/>
+              <a:t>software que promovesse </a:t>
+            </a:r>
+            <a:r>
+              <a:rPr lang="pt-BR" dirty="0" smtClean="0"/>
+              <a:t>...</a:t>
+            </a:r>
+          </a:p>
+          <a:p>
+            <a:pPr marL="171450" indent="-171450">
+              <a:buFont typeface="Arial" panose="020B0604020202020204" pitchFamily="34" charset="0"/>
+              <a:buChar char="•"/>
+            </a:pPr>
+            <a:r>
+              <a:rPr lang="pt-BR" dirty="0" smtClean="0"/>
+              <a:t>Chamado</a:t>
+            </a:r>
+            <a:r>
+              <a:rPr lang="pt-BR" baseline="0" dirty="0" smtClean="0"/>
+              <a:t> TEAR como referencia ao antigo maquinário de fazer tecidos;</a:t>
+            </a:r>
+            <a:endParaRPr lang="pt-BR" dirty="0"/>
+          </a:p>
+        </p:txBody>
+      </p:sp>
+      <p:sp>
+        <p:nvSpPr>
+          <p:cNvPr id="4" name="Espaço Reservado para Número de Slide 3"/>
+          <p:cNvSpPr>
+            <a:spLocks noGrp="1"/>
+          </p:cNvSpPr>
+          <p:nvPr>
+            <p:ph type="sldNum" sz="quarter" idx="10"/>
+          </p:nvPr>
+        </p:nvSpPr>
+        <p:spPr/>
+        <p:txBody>
+          <a:bodyPr/>
+          <a:lstStyle/>
+          <a:p>
+            <a:fld id="{B8C4697C-5588-4126-ACFB-A2CEC35C32B6}" type="slidenum">
+              <a:rPr lang="pt-BR" smtClean="0"/>
+              <a:t>11</a:t>
+            </a:fld>
+            <a:endParaRPr lang="pt-BR"/>
+          </a:p>
+        </p:txBody>
+      </p:sp>
+    </p:spTree>
+    <p:extLst>
+      <p:ext uri="{BB962C8B-B14F-4D97-AF65-F5344CB8AC3E}">
+        <p14:creationId xmlns:p14="http://schemas.microsoft.com/office/powerpoint/2010/main" val="1391226508"/>
+      </p:ext>
+    </p:extLst>
+  </p:cSld>
+  <p:clrMapOvr>
+    <a:masterClrMapping/>
+  </p:clrMapOvr>
+</p:notes>
 </file>
 
 <file path=ppt/slideLayouts/slideLayout1.xml><?xml version="1.0" encoding="utf-8"?>
@@ -1807,7 +3494,7 @@
           <a:p>
             <a:fld id="{48A87A34-81AB-432B-8DAE-1953F412C126}" type="datetimeFigureOut">
               <a:rPr lang="en-US" smtClean="0"/>
-              <a:t>12/4/2016</a:t>
+              <a:t>12/11/2016</a:t>
             </a:fld>
             <a:endParaRPr lang="en-US" dirty="0"/>
           </a:p>
@@ -2059,7 +3746,7 @@
             <a:fld id="{48A87A34-81AB-432B-8DAE-1953F412C126}" type="datetimeFigureOut">
               <a:rPr lang="en-US" smtClean="0"/>
               <a:pPr/>
-              <a:t>12/4/2016</a:t>
+              <a:t>12/11/2016</a:t>
             </a:fld>
             <a:endParaRPr lang="en-US" dirty="0"/>
           </a:p>
@@ -2375,7 +4062,7 @@
             <a:fld id="{48A87A34-81AB-432B-8DAE-1953F412C126}" type="datetimeFigureOut">
               <a:rPr lang="en-US" smtClean="0"/>
               <a:pPr/>
-              <a:t>12/4/2016</a:t>
+              <a:t>12/11/2016</a:t>
             </a:fld>
             <a:endParaRPr lang="en-US" dirty="0"/>
           </a:p>
@@ -2710,7 +4397,7 @@
             <a:fld id="{48A87A34-81AB-432B-8DAE-1953F412C126}" type="datetimeFigureOut">
               <a:rPr lang="en-US" smtClean="0"/>
               <a:pPr/>
-              <a:t>12/4/2016</a:t>
+              <a:t>12/11/2016</a:t>
             </a:fld>
             <a:endParaRPr lang="en-US" dirty="0"/>
           </a:p>
@@ -3026,7 +4713,7 @@
             <a:fld id="{48A87A34-81AB-432B-8DAE-1953F412C126}" type="datetimeFigureOut">
               <a:rPr lang="en-US" smtClean="0"/>
               <a:pPr/>
-              <a:t>12/4/2016</a:t>
+              <a:t>12/11/2016</a:t>
             </a:fld>
             <a:endParaRPr lang="en-US" dirty="0"/>
           </a:p>
@@ -3421,7 +5108,7 @@
             <a:fld id="{48A87A34-81AB-432B-8DAE-1953F412C126}" type="datetimeFigureOut">
               <a:rPr lang="en-US" smtClean="0"/>
               <a:pPr/>
-              <a:t>12/4/2016</a:t>
+              <a:t>12/11/2016</a:t>
             </a:fld>
             <a:endParaRPr lang="en-US" dirty="0"/>
           </a:p>
@@ -3592,7 +5279,7 @@
           <a:p>
             <a:fld id="{48A87A34-81AB-432B-8DAE-1953F412C126}" type="datetimeFigureOut">
               <a:rPr lang="en-US" smtClean="0"/>
-              <a:t>12/4/2016</a:t>
+              <a:t>12/11/2016</a:t>
             </a:fld>
             <a:endParaRPr lang="en-US" dirty="0"/>
           </a:p>
@@ -3772,7 +5459,7 @@
           <a:p>
             <a:fld id="{48A87A34-81AB-432B-8DAE-1953F412C126}" type="datetimeFigureOut">
               <a:rPr lang="en-US" smtClean="0"/>
-              <a:t>12/4/2016</a:t>
+              <a:t>12/11/2016</a:t>
             </a:fld>
             <a:endParaRPr lang="en-US" dirty="0"/>
           </a:p>
@@ -3942,7 +5629,7 @@
           <a:p>
             <a:fld id="{48A87A34-81AB-432B-8DAE-1953F412C126}" type="datetimeFigureOut">
               <a:rPr lang="en-US" smtClean="0"/>
-              <a:t>12/4/2016</a:t>
+              <a:t>12/11/2016</a:t>
             </a:fld>
             <a:endParaRPr lang="en-US" dirty="0"/>
           </a:p>
@@ -4189,7 +5876,7 @@
           <a:p>
             <a:fld id="{48A87A34-81AB-432B-8DAE-1953F412C126}" type="datetimeFigureOut">
               <a:rPr lang="en-US" smtClean="0"/>
-              <a:t>12/4/2016</a:t>
+              <a:t>12/11/2016</a:t>
             </a:fld>
             <a:endParaRPr lang="en-US" dirty="0"/>
           </a:p>
@@ -4421,7 +6108,7 @@
           <a:p>
             <a:fld id="{48A87A34-81AB-432B-8DAE-1953F412C126}" type="datetimeFigureOut">
               <a:rPr lang="en-US" smtClean="0"/>
-              <a:t>12/4/2016</a:t>
+              <a:t>12/11/2016</a:t>
             </a:fld>
             <a:endParaRPr lang="en-US" dirty="0"/>
           </a:p>
@@ -4795,7 +6482,7 @@
           <a:p>
             <a:fld id="{48A87A34-81AB-432B-8DAE-1953F412C126}" type="datetimeFigureOut">
               <a:rPr lang="en-US" smtClean="0"/>
-              <a:t>12/4/2016</a:t>
+              <a:t>12/11/2016</a:t>
             </a:fld>
             <a:endParaRPr lang="en-US" dirty="0"/>
           </a:p>
@@ -4918,7 +6605,7 @@
           <a:p>
             <a:fld id="{48A87A34-81AB-432B-8DAE-1953F412C126}" type="datetimeFigureOut">
               <a:rPr lang="en-US" smtClean="0"/>
-              <a:t>12/4/2016</a:t>
+              <a:t>12/11/2016</a:t>
             </a:fld>
             <a:endParaRPr lang="en-US" dirty="0"/>
           </a:p>
@@ -5013,7 +6700,7 @@
           <a:p>
             <a:fld id="{48A87A34-81AB-432B-8DAE-1953F412C126}" type="datetimeFigureOut">
               <a:rPr lang="en-US" smtClean="0"/>
-              <a:t>12/4/2016</a:t>
+              <a:t>12/11/2016</a:t>
             </a:fld>
             <a:endParaRPr lang="en-US" dirty="0"/>
           </a:p>
@@ -5268,7 +6955,7 @@
           <a:p>
             <a:fld id="{48A87A34-81AB-432B-8DAE-1953F412C126}" type="datetimeFigureOut">
               <a:rPr lang="en-US" smtClean="0"/>
-              <a:t>12/4/2016</a:t>
+              <a:t>12/11/2016</a:t>
             </a:fld>
             <a:endParaRPr lang="en-US" dirty="0"/>
           </a:p>
@@ -5573,7 +7260,7 @@
           <a:p>
             <a:fld id="{48A87A34-81AB-432B-8DAE-1953F412C126}" type="datetimeFigureOut">
               <a:rPr lang="en-US" smtClean="0"/>
-              <a:t>12/4/2016</a:t>
+              <a:t>12/11/2016</a:t>
             </a:fld>
             <a:endParaRPr lang="en-US" dirty="0"/>
           </a:p>
@@ -6276,7 +7963,7 @@
             <a:fld id="{48A87A34-81AB-432B-8DAE-1953F412C126}" type="datetimeFigureOut">
               <a:rPr lang="en-US" smtClean="0"/>
               <a:pPr/>
-              <a:t>12/4/2016</a:t>
+              <a:t>12/11/2016</a:t>
             </a:fld>
             <a:endParaRPr lang="en-US" dirty="0"/>
           </a:p>
@@ -6895,7 +8582,7 @@
           <p:nvPr/>
         </p:nvPicPr>
         <p:blipFill>
-          <a:blip r:embed="rId2">
+          <a:blip r:embed="rId3">
             <a:extLst>
               <a:ext uri="{28A0092B-C50C-407E-A947-70E740481C1C}">
                 <a14:useLocalDpi xmlns:a14="http://schemas.microsoft.com/office/drawing/2010/main" val="0"/>
@@ -6965,29 +8652,122 @@
         </p:nvSpPr>
         <p:spPr>
           <a:xfrm>
-            <a:off x="677335" y="1889498"/>
-            <a:ext cx="8596668" cy="1826581"/>
+            <a:off x="354842" y="2728165"/>
+            <a:ext cx="9553433" cy="1826581"/>
           </a:xfrm>
         </p:spPr>
         <p:txBody>
-          <a:bodyPr/>
-          <a:lstStyle/>
-          <a:p>
-            <a:r>
-              <a:rPr lang="pt-BR" sz="9600" b="1" dirty="0" smtClean="0">
-                <a:solidFill>
-                  <a:schemeClr val="accent2">
-                    <a:lumMod val="75000"/>
-                  </a:schemeClr>
+          <a:bodyPr>
+            <a:noAutofit/>
+          </a:bodyPr>
+          <a:lstStyle/>
+          <a:p>
+            <a:r>
+              <a:rPr lang="pt-BR" sz="3500" dirty="0" smtClean="0">
+                <a:solidFill>
+                  <a:srgbClr val="236292"/>
                 </a:solidFill>
               </a:rPr>
-              <a:t>TEAR</a:t>
-            </a:r>
-            <a:endParaRPr lang="pt-BR" sz="2000" b="1" dirty="0">
+              <a:t>“O </a:t>
+            </a:r>
+            <a:r>
+              <a:rPr lang="pt-BR" sz="3500" dirty="0">
+                <a:solidFill>
+                  <a:srgbClr val="236292"/>
+                </a:solidFill>
+              </a:rPr>
+              <a:t>balanceamento de linhas de produção é um problema complexo, especialmente se incluir </a:t>
+            </a:r>
+            <a:r>
+              <a:rPr lang="pt-BR" sz="3500" dirty="0" smtClean="0">
+                <a:solidFill>
+                  <a:srgbClr val="236292"/>
+                </a:solidFill>
+              </a:rPr>
+              <a:t>produção simultânea </a:t>
+            </a:r>
+            <a:r>
+              <a:rPr lang="pt-BR" sz="3500" dirty="0">
+                <a:solidFill>
+                  <a:srgbClr val="236292"/>
+                </a:solidFill>
+              </a:rPr>
+              <a:t>de modelos </a:t>
+            </a:r>
+            <a:r>
+              <a:rPr lang="pt-BR" sz="3500" dirty="0" smtClean="0">
+                <a:solidFill>
+                  <a:srgbClr val="236292"/>
+                </a:solidFill>
+              </a:rPr>
+              <a:t>variados. </a:t>
+            </a:r>
+            <a:br>
+              <a:rPr lang="pt-BR" sz="3500" dirty="0" smtClean="0">
+                <a:solidFill>
+                  <a:srgbClr val="236292"/>
+                </a:solidFill>
+              </a:rPr>
+            </a:br>
+            <a:r>
+              <a:rPr lang="pt-BR" sz="3500" dirty="0" smtClean="0">
+                <a:solidFill>
+                  <a:srgbClr val="236292"/>
+                </a:solidFill>
+              </a:rPr>
+              <a:t>Torna-se </a:t>
+            </a:r>
+            <a:r>
+              <a:rPr lang="pt-BR" sz="3500" dirty="0">
+                <a:solidFill>
+                  <a:srgbClr val="236292"/>
+                </a:solidFill>
+              </a:rPr>
+              <a:t>por isso humanamente impossível fazer o </a:t>
+            </a:r>
+            <a:r>
+              <a:rPr lang="pt-BR" sz="3500" dirty="0" smtClean="0">
+                <a:solidFill>
+                  <a:srgbClr val="236292"/>
+                </a:solidFill>
+              </a:rPr>
+              <a:t>balanceamento </a:t>
+            </a:r>
+            <a:r>
+              <a:rPr lang="pt-BR" sz="3500" dirty="0">
+                <a:solidFill>
+                  <a:srgbClr val="236292"/>
+                </a:solidFill>
+              </a:rPr>
+              <a:t>manualmente e obter resultados </a:t>
+            </a:r>
+            <a:r>
+              <a:rPr lang="pt-BR" sz="3500" dirty="0" smtClean="0">
+                <a:solidFill>
+                  <a:srgbClr val="236292"/>
+                </a:solidFill>
+              </a:rPr>
+              <a:t>satisfatórios </a:t>
+            </a:r>
+            <a:r>
+              <a:rPr lang="pt-BR" sz="3500" dirty="0">
+                <a:solidFill>
+                  <a:srgbClr val="236292"/>
+                </a:solidFill>
+              </a:rPr>
+              <a:t>de produtividade</a:t>
+            </a:r>
+            <a:r>
+              <a:rPr lang="pt-BR" sz="3500" dirty="0" smtClean="0">
+                <a:solidFill>
+                  <a:srgbClr val="236292"/>
+                </a:solidFill>
+              </a:rPr>
+              <a:t>.”</a:t>
+            </a:r>
+            <a:endParaRPr lang="pt-BR" sz="3500" dirty="0">
               <a:solidFill>
-                <a:schemeClr val="bg2">
-                  <a:lumMod val="50000"/>
-                </a:schemeClr>
+                <a:srgbClr val="236292"/>
               </a:solidFill>
             </a:endParaRPr>
           </a:p>
@@ -7005,43 +8785,17 @@
         </p:nvSpPr>
         <p:spPr>
           <a:xfrm>
-            <a:off x="677335" y="3780473"/>
-            <a:ext cx="8596668" cy="1731685"/>
+            <a:off x="354842" y="4595690"/>
+            <a:ext cx="8596668" cy="860400"/>
           </a:xfrm>
         </p:spPr>
         <p:txBody>
-          <a:bodyPr>
-            <a:normAutofit/>
-          </a:bodyPr>
-          <a:lstStyle/>
-          <a:p>
-            <a:pPr marL="342900" indent="-342900">
-              <a:buFont typeface="Wingdings" panose="05000000000000000000" pitchFamily="2" charset="2"/>
-              <a:buChar char="§"/>
-            </a:pPr>
+          <a:bodyPr/>
+          <a:lstStyle/>
+          <a:p>
             <a:r>
               <a:rPr lang="pt-BR" dirty="0" smtClean="0"/>
-              <a:t>Informatização dos processos de cronometragem;</a:t>
-            </a:r>
-          </a:p>
-          <a:p>
-            <a:pPr marL="342900" indent="-342900">
-              <a:buFont typeface="Arial" panose="020B0604020202020204" pitchFamily="34" charset="0"/>
-              <a:buChar char="•"/>
-            </a:pPr>
-            <a:r>
-              <a:rPr lang="pt-BR" dirty="0" smtClean="0"/>
-              <a:t>Acompanhamento das Ordens de Produção;</a:t>
-            </a:r>
-          </a:p>
-          <a:p>
-            <a:pPr marL="342900" indent="-342900">
-              <a:buFont typeface="Arial" panose="020B0604020202020204" pitchFamily="34" charset="0"/>
-              <a:buChar char="•"/>
-            </a:pPr>
-            <a:r>
-              <a:rPr lang="pt-BR" dirty="0" smtClean="0"/>
-              <a:t>Automação do processo de balanceamento de Linha de Produção;</a:t>
+              <a:t>Fonseca(2011, p.27)</a:t>
             </a:r>
             <a:endParaRPr lang="pt-BR" dirty="0"/>
           </a:p>
@@ -7050,7 +8804,7 @@
     </p:spTree>
     <p:extLst>
       <p:ext uri="{BB962C8B-B14F-4D97-AF65-F5344CB8AC3E}">
-        <p14:creationId xmlns:p14="http://schemas.microsoft.com/office/powerpoint/2010/main" val="2618173949"/>
+        <p14:creationId xmlns:p14="http://schemas.microsoft.com/office/powerpoint/2010/main" val="1770601684"/>
       </p:ext>
     </p:extLst>
   </p:cSld>
@@ -7094,6 +8848,526 @@
             <p:ph type="title"/>
           </p:nvPr>
         </p:nvSpPr>
+        <p:spPr>
+          <a:xfrm>
+            <a:off x="677335" y="1889498"/>
+            <a:ext cx="8596668" cy="1826581"/>
+          </a:xfrm>
+        </p:spPr>
+        <p:txBody>
+          <a:bodyPr/>
+          <a:lstStyle/>
+          <a:p>
+            <a:r>
+              <a:rPr lang="pt-BR" sz="9600" b="1" dirty="0" smtClean="0">
+                <a:solidFill>
+                  <a:schemeClr val="accent2">
+                    <a:lumMod val="75000"/>
+                  </a:schemeClr>
+                </a:solidFill>
+              </a:rPr>
+              <a:t>TEAR</a:t>
+            </a:r>
+            <a:endParaRPr lang="pt-BR" sz="2000" b="1" dirty="0">
+              <a:solidFill>
+                <a:schemeClr val="bg2">
+                  <a:lumMod val="50000"/>
+                </a:schemeClr>
+              </a:solidFill>
+            </a:endParaRPr>
+          </a:p>
+        </p:txBody>
+      </p:sp>
+      <p:sp>
+        <p:nvSpPr>
+          <p:cNvPr id="5" name="Espaço Reservado para Texto 4"/>
+          <p:cNvSpPr>
+            <a:spLocks noGrp="1"/>
+          </p:cNvSpPr>
+          <p:nvPr>
+            <p:ph type="body" idx="1"/>
+          </p:nvPr>
+        </p:nvSpPr>
+        <p:spPr>
+          <a:xfrm>
+            <a:off x="677335" y="3780473"/>
+            <a:ext cx="8596668" cy="1731685"/>
+          </a:xfrm>
+        </p:spPr>
+        <p:txBody>
+          <a:bodyPr>
+            <a:normAutofit/>
+          </a:bodyPr>
+          <a:lstStyle/>
+          <a:p>
+            <a:pPr marL="342900" indent="-342900">
+              <a:buFont typeface="Wingdings" panose="05000000000000000000" pitchFamily="2" charset="2"/>
+              <a:buChar char="§"/>
+            </a:pPr>
+            <a:r>
+              <a:rPr lang="pt-BR" dirty="0" smtClean="0"/>
+              <a:t>Informatização dos processos de cronometragem;</a:t>
+            </a:r>
+          </a:p>
+          <a:p>
+            <a:pPr marL="342900" indent="-342900">
+              <a:buFont typeface="Arial" panose="020B0604020202020204" pitchFamily="34" charset="0"/>
+              <a:buChar char="•"/>
+            </a:pPr>
+            <a:r>
+              <a:rPr lang="pt-BR" dirty="0" smtClean="0"/>
+              <a:t>Acompanhamento das Ordens de Produção;</a:t>
+            </a:r>
+          </a:p>
+          <a:p>
+            <a:pPr marL="342900" indent="-342900">
+              <a:buFont typeface="Arial" panose="020B0604020202020204" pitchFamily="34" charset="0"/>
+              <a:buChar char="•"/>
+            </a:pPr>
+            <a:r>
+              <a:rPr lang="pt-BR" dirty="0" smtClean="0"/>
+              <a:t>Automação do processo de balanceamento de Linha de Produção;</a:t>
+            </a:r>
+            <a:endParaRPr lang="pt-BR" dirty="0"/>
+          </a:p>
+        </p:txBody>
+      </p:sp>
+    </p:spTree>
+    <p:extLst>
+      <p:ext uri="{BB962C8B-B14F-4D97-AF65-F5344CB8AC3E}">
+        <p14:creationId xmlns:p14="http://schemas.microsoft.com/office/powerpoint/2010/main" val="2618173949"/>
+      </p:ext>
+    </p:extLst>
+  </p:cSld>
+  <p:clrMapOvr>
+    <a:masterClrMapping/>
+  </p:clrMapOvr>
+  <p:timing>
+    <p:tnLst>
+      <p:par>
+        <p:cTn id="1" dur="indefinite" restart="never" nodeType="tmRoot"/>
+      </p:par>
+    </p:tnLst>
+  </p:timing>
+</p:sld>
+</file>
+
+<file path=ppt/slides/slide12.xml><?xml version="1.0" encoding="utf-8"?>
+<p:sld xmlns:a="http://schemas.openxmlformats.org/drawingml/2006/main" xmlns:r="http://schemas.openxmlformats.org/officeDocument/2006/relationships" xmlns:p="http://schemas.openxmlformats.org/presentationml/2006/main">
+  <p:cSld>
+    <p:spTree>
+      <p:nvGrpSpPr>
+        <p:cNvPr id="1" name=""/>
+        <p:cNvGrpSpPr/>
+        <p:nvPr/>
+      </p:nvGrpSpPr>
+      <p:grpSpPr>
+        <a:xfrm>
+          <a:off x="0" y="0"/>
+          <a:ext cx="0" cy="0"/>
+          <a:chOff x="0" y="0"/>
+          <a:chExt cx="0" cy="0"/>
+        </a:xfrm>
+      </p:grpSpPr>
+      <p:sp>
+        <p:nvSpPr>
+          <p:cNvPr id="6" name="Título 5"/>
+          <p:cNvSpPr>
+            <a:spLocks noGrp="1"/>
+          </p:cNvSpPr>
+          <p:nvPr>
+            <p:ph type="title"/>
+          </p:nvPr>
+        </p:nvSpPr>
+        <p:spPr>
+          <a:xfrm>
+            <a:off x="458966" y="395784"/>
+            <a:ext cx="8516546" cy="696028"/>
+          </a:xfrm>
+        </p:spPr>
+        <p:style>
+          <a:lnRef idx="1">
+            <a:schemeClr val="accent1"/>
+          </a:lnRef>
+          <a:fillRef idx="3">
+            <a:schemeClr val="accent1"/>
+          </a:fillRef>
+          <a:effectRef idx="2">
+            <a:schemeClr val="accent1"/>
+          </a:effectRef>
+          <a:fontRef idx="minor">
+            <a:schemeClr val="lt1"/>
+          </a:fontRef>
+        </p:style>
+        <p:txBody>
+          <a:bodyPr anchor="ctr" anchorCtr="0">
+            <a:noAutofit/>
+          </a:bodyPr>
+          <a:lstStyle/>
+          <a:p>
+            <a:pPr algn="ctr"/>
+            <a:r>
+              <a:rPr lang="pt-BR" sz="4000" b="1" dirty="0" smtClean="0">
+                <a:solidFill>
+                  <a:schemeClr val="bg1"/>
+                </a:solidFill>
+              </a:rPr>
+              <a:t>Divisão de Tarefas</a:t>
+            </a:r>
+            <a:endParaRPr lang="pt-BR" sz="4000" b="1" dirty="0">
+              <a:solidFill>
+                <a:schemeClr val="bg1"/>
+              </a:solidFill>
+            </a:endParaRPr>
+          </a:p>
+        </p:txBody>
+      </p:sp>
+      <p:sp>
+        <p:nvSpPr>
+          <p:cNvPr id="7" name="Espaço Reservado para Texto 6"/>
+          <p:cNvSpPr>
+            <a:spLocks noGrp="1"/>
+          </p:cNvSpPr>
+          <p:nvPr>
+            <p:ph type="body" idx="1"/>
+          </p:nvPr>
+        </p:nvSpPr>
+        <p:spPr>
+          <a:xfrm>
+            <a:off x="462493" y="1236196"/>
+            <a:ext cx="4185623" cy="5110014"/>
+          </a:xfrm>
+        </p:spPr>
+        <p:style>
+          <a:lnRef idx="1">
+            <a:schemeClr val="accent1"/>
+          </a:lnRef>
+          <a:fillRef idx="3">
+            <a:schemeClr val="accent1"/>
+          </a:fillRef>
+          <a:effectRef idx="2">
+            <a:schemeClr val="accent1"/>
+          </a:effectRef>
+          <a:fontRef idx="minor">
+            <a:schemeClr val="lt1"/>
+          </a:fontRef>
+        </p:style>
+        <p:txBody>
+          <a:bodyPr anchor="t" anchorCtr="0"/>
+          <a:lstStyle/>
+          <a:p>
+            <a:pPr algn="ctr"/>
+            <a:r>
+              <a:rPr lang="pt-BR" sz="2800" b="1" dirty="0" smtClean="0"/>
+              <a:t>Esta Pesquisa</a:t>
+            </a:r>
+            <a:endParaRPr lang="pt-BR" sz="2800" b="1" dirty="0"/>
+          </a:p>
+        </p:txBody>
+      </p:sp>
+      <p:sp>
+        <p:nvSpPr>
+          <p:cNvPr id="8" name="Espaço Reservado para Conteúdo 7"/>
+          <p:cNvSpPr>
+            <a:spLocks noGrp="1"/>
+          </p:cNvSpPr>
+          <p:nvPr>
+            <p:ph sz="half" idx="2"/>
+          </p:nvPr>
+        </p:nvSpPr>
+        <p:spPr>
+          <a:xfrm>
+            <a:off x="462493" y="1877426"/>
+            <a:ext cx="4185623" cy="4468784"/>
+          </a:xfrm>
+        </p:spPr>
+        <p:txBody>
+          <a:bodyPr numCol="1">
+            <a:normAutofit fontScale="47500" lnSpcReduction="20000"/>
+          </a:bodyPr>
+          <a:lstStyle/>
+          <a:p>
+            <a:pPr>
+              <a:lnSpc>
+                <a:spcPct val="120000"/>
+              </a:lnSpc>
+              <a:buClr>
+                <a:schemeClr val="bg2"/>
+              </a:buClr>
+            </a:pPr>
+            <a:r>
+              <a:rPr lang="pt-BR" sz="3800" dirty="0" smtClean="0"/>
+              <a:t>Interfaces desktop;</a:t>
+            </a:r>
+          </a:p>
+          <a:p>
+            <a:pPr>
+              <a:lnSpc>
+                <a:spcPct val="120000"/>
+              </a:lnSpc>
+              <a:buClr>
+                <a:schemeClr val="bg2"/>
+              </a:buClr>
+            </a:pPr>
+            <a:r>
+              <a:rPr lang="pt-BR" sz="3800" dirty="0" smtClean="0"/>
+              <a:t>Banco de dados;</a:t>
+            </a:r>
+          </a:p>
+          <a:p>
+            <a:pPr>
+              <a:lnSpc>
+                <a:spcPct val="120000"/>
+              </a:lnSpc>
+              <a:buClr>
+                <a:schemeClr val="bg2"/>
+              </a:buClr>
+            </a:pPr>
+            <a:r>
+              <a:rPr lang="pt-BR" sz="3800" dirty="0" smtClean="0"/>
+              <a:t>Relatórios;</a:t>
+            </a:r>
+          </a:p>
+          <a:p>
+            <a:pPr>
+              <a:lnSpc>
+                <a:spcPct val="120000"/>
+              </a:lnSpc>
+              <a:buClr>
+                <a:schemeClr val="bg2"/>
+              </a:buClr>
+            </a:pPr>
+            <a:r>
+              <a:rPr lang="pt-BR" sz="3800" dirty="0" smtClean="0"/>
+              <a:t>Integração com o aplicativo de cronometragem;</a:t>
+            </a:r>
+          </a:p>
+          <a:p>
+            <a:pPr>
+              <a:lnSpc>
+                <a:spcPct val="120000"/>
+              </a:lnSpc>
+              <a:buClr>
+                <a:schemeClr val="bg2"/>
+              </a:buClr>
+            </a:pPr>
+            <a:r>
+              <a:rPr lang="pt-BR" sz="3800" dirty="0" smtClean="0"/>
+              <a:t>Cálculo do Tempo padrão;</a:t>
+            </a:r>
+          </a:p>
+          <a:p>
+            <a:pPr>
+              <a:lnSpc>
+                <a:spcPct val="120000"/>
+              </a:lnSpc>
+              <a:buClr>
+                <a:schemeClr val="bg2"/>
+              </a:buClr>
+            </a:pPr>
+            <a:r>
+              <a:rPr lang="pt-BR" sz="3800" dirty="0" smtClean="0"/>
+              <a:t>Controle de movimentações da OP;</a:t>
+            </a:r>
+          </a:p>
+          <a:p>
+            <a:pPr>
+              <a:lnSpc>
+                <a:spcPct val="120000"/>
+              </a:lnSpc>
+              <a:buClr>
+                <a:schemeClr val="bg2"/>
+              </a:buClr>
+            </a:pPr>
+            <a:r>
+              <a:rPr lang="pt-BR" sz="3800" dirty="0" smtClean="0"/>
+              <a:t>Estrutura de dados usada pela UNIT de balanceamento;</a:t>
+            </a:r>
+          </a:p>
+          <a:p>
+            <a:pPr>
+              <a:lnSpc>
+                <a:spcPct val="120000"/>
+              </a:lnSpc>
+              <a:buClr>
+                <a:schemeClr val="bg2"/>
+              </a:buClr>
+            </a:pPr>
+            <a:r>
+              <a:rPr lang="pt-BR" sz="3800" dirty="0" smtClean="0"/>
+              <a:t>Salvar dados de retorno e exibir gráfico de </a:t>
+            </a:r>
+            <a:r>
+              <a:rPr lang="pt-BR" sz="3800" dirty="0" err="1"/>
+              <a:t>G</a:t>
+            </a:r>
+            <a:r>
+              <a:rPr lang="pt-BR" sz="3800" dirty="0" err="1" smtClean="0"/>
+              <a:t>antt</a:t>
+            </a:r>
+            <a:r>
+              <a:rPr lang="pt-BR" sz="3800" dirty="0" smtClean="0"/>
+              <a:t>;</a:t>
+            </a:r>
+          </a:p>
+          <a:p>
+            <a:pPr>
+              <a:lnSpc>
+                <a:spcPct val="120000"/>
+              </a:lnSpc>
+              <a:buClr>
+                <a:schemeClr val="bg2"/>
+              </a:buClr>
+            </a:pPr>
+            <a:r>
+              <a:rPr lang="pt-BR" sz="3800" dirty="0" smtClean="0"/>
+              <a:t>Controle Acesso;</a:t>
+            </a:r>
+          </a:p>
+          <a:p>
+            <a:pPr>
+              <a:buClr>
+                <a:schemeClr val="bg2"/>
+              </a:buClr>
+            </a:pPr>
+            <a:endParaRPr lang="pt-BR" dirty="0"/>
+          </a:p>
+        </p:txBody>
+      </p:sp>
+      <p:sp>
+        <p:nvSpPr>
+          <p:cNvPr id="9" name="Espaço Reservado para Texto 8"/>
+          <p:cNvSpPr>
+            <a:spLocks noGrp="1"/>
+          </p:cNvSpPr>
+          <p:nvPr>
+            <p:ph type="body" sz="quarter" idx="3"/>
+          </p:nvPr>
+        </p:nvSpPr>
+        <p:spPr>
+          <a:xfrm>
+            <a:off x="4789894" y="1236198"/>
+            <a:ext cx="4185618" cy="5110012"/>
+          </a:xfrm>
+        </p:spPr>
+        <p:style>
+          <a:lnRef idx="1">
+            <a:schemeClr val="accent1"/>
+          </a:lnRef>
+          <a:fillRef idx="3">
+            <a:schemeClr val="accent1"/>
+          </a:fillRef>
+          <a:effectRef idx="2">
+            <a:schemeClr val="accent1"/>
+          </a:effectRef>
+          <a:fontRef idx="minor">
+            <a:schemeClr val="lt1"/>
+          </a:fontRef>
+        </p:style>
+        <p:txBody>
+          <a:bodyPr anchor="t" anchorCtr="0"/>
+          <a:lstStyle/>
+          <a:p>
+            <a:pPr algn="ctr"/>
+            <a:r>
+              <a:rPr lang="pt-BR" sz="2800" b="1" dirty="0" smtClean="0"/>
+              <a:t>Iniciação científica</a:t>
+            </a:r>
+            <a:endParaRPr lang="pt-BR" sz="2800" b="1" dirty="0"/>
+          </a:p>
+        </p:txBody>
+      </p:sp>
+      <p:sp>
+        <p:nvSpPr>
+          <p:cNvPr id="10" name="Espaço Reservado para Conteúdo 9"/>
+          <p:cNvSpPr>
+            <a:spLocks noGrp="1"/>
+          </p:cNvSpPr>
+          <p:nvPr>
+            <p:ph sz="quarter" idx="4"/>
+          </p:nvPr>
+        </p:nvSpPr>
+        <p:spPr>
+          <a:xfrm>
+            <a:off x="4803543" y="1885109"/>
+            <a:ext cx="4185617" cy="4496303"/>
+          </a:xfrm>
+        </p:spPr>
+        <p:txBody>
+          <a:bodyPr/>
+          <a:lstStyle/>
+          <a:p>
+            <a:pPr>
+              <a:buClr>
+                <a:schemeClr val="bg2"/>
+              </a:buClr>
+            </a:pPr>
+            <a:r>
+              <a:rPr lang="pt-BR" dirty="0" smtClean="0"/>
+              <a:t>APP cronometragem;</a:t>
+            </a:r>
+          </a:p>
+          <a:p>
+            <a:pPr>
+              <a:buClr>
+                <a:schemeClr val="bg2"/>
+              </a:buClr>
+            </a:pPr>
+            <a:r>
+              <a:rPr lang="pt-BR" dirty="0" smtClean="0"/>
+              <a:t>UNIT de Balanceamento;</a:t>
+            </a:r>
+            <a:endParaRPr lang="pt-BR" dirty="0"/>
+          </a:p>
+        </p:txBody>
+      </p:sp>
+    </p:spTree>
+    <p:extLst>
+      <p:ext uri="{BB962C8B-B14F-4D97-AF65-F5344CB8AC3E}">
+        <p14:creationId xmlns:p14="http://schemas.microsoft.com/office/powerpoint/2010/main" val="1551327227"/>
+      </p:ext>
+    </p:extLst>
+  </p:cSld>
+  <p:clrMapOvr>
+    <a:masterClrMapping/>
+  </p:clrMapOvr>
+  <p:timing>
+    <p:tnLst>
+      <p:par>
+        <p:cTn id="1" dur="indefinite" restart="never" nodeType="tmRoot"/>
+      </p:par>
+    </p:tnLst>
+  </p:timing>
+</p:sld>
+</file>
+
+<file path=ppt/slides/slide13.xml><?xml version="1.0" encoding="utf-8"?>
+<p:sld xmlns:a="http://schemas.openxmlformats.org/drawingml/2006/main" xmlns:r="http://schemas.openxmlformats.org/officeDocument/2006/relationships" xmlns:p="http://schemas.openxmlformats.org/presentationml/2006/main">
+  <p:cSld>
+    <p:spTree>
+      <p:nvGrpSpPr>
+        <p:cNvPr id="1" name=""/>
+        <p:cNvGrpSpPr/>
+        <p:nvPr/>
+      </p:nvGrpSpPr>
+      <p:grpSpPr>
+        <a:xfrm>
+          <a:off x="0" y="0"/>
+          <a:ext cx="0" cy="0"/>
+          <a:chOff x="0" y="0"/>
+          <a:chExt cx="0" cy="0"/>
+        </a:xfrm>
+      </p:grpSpPr>
+      <p:sp>
+        <p:nvSpPr>
+          <p:cNvPr id="4" name="Título 3"/>
+          <p:cNvSpPr>
+            <a:spLocks noGrp="1"/>
+          </p:cNvSpPr>
+          <p:nvPr>
+            <p:ph type="title"/>
+          </p:nvPr>
+        </p:nvSpPr>
         <p:spPr/>
         <p:txBody>
           <a:bodyPr>
@@ -7129,10 +9403,44 @@
         </p:nvSpPr>
         <p:spPr/>
         <p:txBody>
-          <a:bodyPr/>
-          <a:lstStyle/>
-          <a:p>
-            <a:endParaRPr lang="pt-BR"/>
+          <a:bodyPr>
+            <a:normAutofit/>
+          </a:bodyPr>
+          <a:lstStyle/>
+          <a:p>
+            <a:r>
+              <a:rPr lang="pt-BR" sz="2400" dirty="0" smtClean="0"/>
+              <a:t>DELPHI;</a:t>
+            </a:r>
+          </a:p>
+          <a:p>
+            <a:r>
+              <a:rPr lang="pt-BR" sz="2400" dirty="0" smtClean="0"/>
+              <a:t>MYSQL;</a:t>
+            </a:r>
+          </a:p>
+          <a:p>
+            <a:r>
+              <a:rPr lang="pt-BR" sz="2400" dirty="0" smtClean="0"/>
+              <a:t>JSON;</a:t>
+            </a:r>
+          </a:p>
+          <a:p>
+            <a:r>
+              <a:rPr lang="pt-BR" sz="2400" dirty="0" smtClean="0"/>
+              <a:t>Herança de interface;</a:t>
+            </a:r>
+          </a:p>
+          <a:p>
+            <a:r>
+              <a:rPr lang="pt-BR" sz="2400" dirty="0" smtClean="0"/>
+              <a:t>Relatórios dinâmicos</a:t>
+            </a:r>
+            <a:r>
+              <a:rPr lang="pt-BR" sz="2400" dirty="0" smtClean="0"/>
+              <a:t>;</a:t>
+            </a:r>
+            <a:endParaRPr lang="pt-BR" sz="2400" dirty="0" smtClean="0"/>
           </a:p>
         </p:txBody>
       </p:sp>
@@ -7146,10 +9454,17 @@
   <p:clrMapOvr>
     <a:masterClrMapping/>
   </p:clrMapOvr>
+  <p:timing>
+    <p:tnLst>
+      <p:par>
+        <p:cTn id="1" dur="indefinite" restart="never" nodeType="tmRoot"/>
+      </p:par>
+    </p:tnLst>
+  </p:timing>
 </p:sld>
 </file>
 
-<file path=ppt/slides/slide12.xml><?xml version="1.0" encoding="utf-8"?>
+<file path=ppt/slides/slide14.xml><?xml version="1.0" encoding="utf-8"?>
 <p:sld xmlns:a="http://schemas.openxmlformats.org/drawingml/2006/main" xmlns:r="http://schemas.openxmlformats.org/officeDocument/2006/relationships" xmlns:p="http://schemas.openxmlformats.org/presentationml/2006/main">
   <p:cSld>
     <p:spTree>
@@ -7259,7 +9574,7 @@
 </p:sld>
 </file>
 
-<file path=ppt/slides/slide13.xml><?xml version="1.0" encoding="utf-8"?>
+<file path=ppt/slides/slide15.xml><?xml version="1.0" encoding="utf-8"?>
 <p:sld xmlns:a="http://schemas.openxmlformats.org/drawingml/2006/main" xmlns:r="http://schemas.openxmlformats.org/officeDocument/2006/relationships" xmlns:p="http://schemas.openxmlformats.org/presentationml/2006/main">
   <p:cSld>
     <p:spTree>
@@ -7348,7 +9663,7 @@
 </p:sld>
 </file>
 
-<file path=ppt/slides/slide14.xml><?xml version="1.0" encoding="utf-8"?>
+<file path=ppt/slides/slide16.xml><?xml version="1.0" encoding="utf-8"?>
 <p:sld xmlns:a="http://schemas.openxmlformats.org/drawingml/2006/main" xmlns:r="http://schemas.openxmlformats.org/officeDocument/2006/relationships" xmlns:p="http://schemas.openxmlformats.org/presentationml/2006/main">
   <p:cSld>
     <p:spTree>
@@ -7462,7 +9777,7 @@
 </p:sld>
 </file>
 
-<file path=ppt/slides/slide15.xml><?xml version="1.0" encoding="utf-8"?>
+<file path=ppt/slides/slide17.xml><?xml version="1.0" encoding="utf-8"?>
 <p:sld xmlns:a="http://schemas.openxmlformats.org/drawingml/2006/main" xmlns:r="http://schemas.openxmlformats.org/officeDocument/2006/relationships" xmlns:p="http://schemas.openxmlformats.org/presentationml/2006/main">
   <p:cSld>
     <p:spTree>
@@ -7567,7 +9882,7 @@
 </p:sld>
 </file>
 
-<file path=ppt/slides/slide16.xml><?xml version="1.0" encoding="utf-8"?>
+<file path=ppt/slides/slide18.xml><?xml version="1.0" encoding="utf-8"?>
 <p:sld xmlns:a="http://schemas.openxmlformats.org/drawingml/2006/main" xmlns:r="http://schemas.openxmlformats.org/officeDocument/2006/relationships" xmlns:p="http://schemas.openxmlformats.org/presentationml/2006/main">
   <p:cSld>
     <p:spTree>
@@ -7694,7 +10009,7 @@
 </p:sld>
 </file>
 
-<file path=ppt/slides/slide17.xml><?xml version="1.0" encoding="utf-8"?>
+<file path=ppt/slides/slide19.xml><?xml version="1.0" encoding="utf-8"?>
 <p:sld xmlns:a="http://schemas.openxmlformats.org/drawingml/2006/main" xmlns:r="http://schemas.openxmlformats.org/officeDocument/2006/relationships" xmlns:p="http://schemas.openxmlformats.org/presentationml/2006/main">
   <p:cSld>
     <p:spTree>
@@ -7800,7 +10115,7 @@
 </p:sld>
 </file>
 
-<file path=ppt/slides/slide18.xml><?xml version="1.0" encoding="utf-8"?>
+<file path=ppt/slides/slide2.xml><?xml version="1.0" encoding="utf-8"?>
 <p:sld xmlns:a="http://schemas.openxmlformats.org/drawingml/2006/main" xmlns:r="http://schemas.openxmlformats.org/officeDocument/2006/relationships" xmlns:p="http://schemas.openxmlformats.org/presentationml/2006/main">
   <p:cSld>
     <p:spTree>
@@ -7829,6 +10144,97 @@
         </p:nvSpPr>
         <p:spPr/>
         <p:txBody>
+          <a:bodyPr>
+            <a:normAutofit/>
+          </a:bodyPr>
+          <a:lstStyle/>
+          <a:p>
+            <a:endParaRPr lang="pt-BR" sz="4600" b="1" dirty="0">
+              <a:solidFill>
+                <a:schemeClr val="accent2">
+                  <a:lumMod val="75000"/>
+                </a:schemeClr>
+              </a:solidFill>
+              <a:latin typeface="Times New Roman" panose="02020603050405020304" pitchFamily="18" charset="0"/>
+              <a:cs typeface="Times New Roman" panose="02020603050405020304" pitchFamily="18" charset="0"/>
+            </a:endParaRPr>
+          </a:p>
+        </p:txBody>
+      </p:sp>
+      <p:graphicFrame>
+        <p:nvGraphicFramePr>
+          <p:cNvPr id="8" name="Espaço Reservado para Conteúdo 7"/>
+          <p:cNvGraphicFramePr>
+            <a:graphicFrameLocks noGrp="1"/>
+          </p:cNvGraphicFramePr>
+          <p:nvPr>
+            <p:ph idx="1"/>
+            <p:extLst>
+              <p:ext uri="{D42A27DB-BD31-4B8C-83A1-F6EECF244321}">
+                <p14:modId xmlns:p14="http://schemas.microsoft.com/office/powerpoint/2010/main" val="111916648"/>
+              </p:ext>
+            </p:extLst>
+          </p:nvPr>
+        </p:nvGraphicFramePr>
+        <p:xfrm>
+          <a:off x="154546" y="180304"/>
+          <a:ext cx="11797048" cy="6465195"/>
+        </p:xfrm>
+        <a:graphic>
+          <a:graphicData uri="http://schemas.openxmlformats.org/drawingml/2006/chart">
+            <c:chart xmlns:c="http://schemas.openxmlformats.org/drawingml/2006/chart" xmlns:r="http://schemas.openxmlformats.org/officeDocument/2006/relationships" r:id="rId3"/>
+          </a:graphicData>
+        </a:graphic>
+      </p:graphicFrame>
+    </p:spTree>
+    <p:extLst>
+      <p:ext uri="{BB962C8B-B14F-4D97-AF65-F5344CB8AC3E}">
+        <p14:creationId xmlns:p14="http://schemas.microsoft.com/office/powerpoint/2010/main" val="597344595"/>
+      </p:ext>
+    </p:extLst>
+  </p:cSld>
+  <p:clrMapOvr>
+    <a:masterClrMapping/>
+  </p:clrMapOvr>
+  <p:timing>
+    <p:tnLst>
+      <p:par>
+        <p:cTn id="1" dur="indefinite" restart="never" nodeType="tmRoot"/>
+      </p:par>
+    </p:tnLst>
+  </p:timing>
+</p:sld>
+</file>
+
+<file path=ppt/slides/slide20.xml><?xml version="1.0" encoding="utf-8"?>
+<p:sld xmlns:a="http://schemas.openxmlformats.org/drawingml/2006/main" xmlns:r="http://schemas.openxmlformats.org/officeDocument/2006/relationships" xmlns:p="http://schemas.openxmlformats.org/presentationml/2006/main">
+  <p:cSld>
+    <p:spTree>
+      <p:nvGrpSpPr>
+        <p:cNvPr id="1" name=""/>
+        <p:cNvGrpSpPr/>
+        <p:nvPr/>
+      </p:nvGrpSpPr>
+      <p:grpSpPr>
+        <a:xfrm>
+          <a:off x="0" y="0"/>
+          <a:ext cx="0" cy="0"/>
+          <a:chOff x="0" y="0"/>
+          <a:chExt cx="0" cy="0"/>
+        </a:xfrm>
+      </p:grpSpPr>
+      <p:sp>
+        <p:nvSpPr>
+          <p:cNvPr id="2" name="Título 1"/>
+          <p:cNvSpPr>
+            <a:spLocks noGrp="1"/>
+          </p:cNvSpPr>
+          <p:nvPr>
+            <p:ph type="title"/>
+          </p:nvPr>
+        </p:nvSpPr>
+        <p:spPr/>
+        <p:txBody>
           <a:bodyPr/>
           <a:lstStyle/>
           <a:p>
@@ -7884,7 +10290,7 @@
           <a:p>
             <a:r>
               <a:rPr lang="pt-BR" sz="2400" dirty="0" smtClean="0"/>
-              <a:t>Melhora significativa no processo de distribuição de carga produtiva;</a:t>
+              <a:t>Melhora significativa na distribuição da carga produtiva;</a:t>
             </a:r>
             <a:endParaRPr lang="pt-BR" sz="2400" dirty="0"/>
           </a:p>
@@ -7910,7 +10316,7 @@
 </p:sld>
 </file>
 
-<file path=ppt/slides/slide19.xml><?xml version="1.0" encoding="utf-8"?>
+<file path=ppt/slides/slide21.xml><?xml version="1.0" encoding="utf-8"?>
 <p:sld xmlns:a="http://schemas.openxmlformats.org/drawingml/2006/main" xmlns:r="http://schemas.openxmlformats.org/officeDocument/2006/relationships" xmlns:p="http://schemas.openxmlformats.org/presentationml/2006/main">
   <p:cSld>
     <p:spTree>
@@ -8062,97 +10468,6 @@
 </p:sld>
 </file>
 
-<file path=ppt/slides/slide2.xml><?xml version="1.0" encoding="utf-8"?>
-<p:sld xmlns:a="http://schemas.openxmlformats.org/drawingml/2006/main" xmlns:r="http://schemas.openxmlformats.org/officeDocument/2006/relationships" xmlns:p="http://schemas.openxmlformats.org/presentationml/2006/main">
-  <p:cSld>
-    <p:spTree>
-      <p:nvGrpSpPr>
-        <p:cNvPr id="1" name=""/>
-        <p:cNvGrpSpPr/>
-        <p:nvPr/>
-      </p:nvGrpSpPr>
-      <p:grpSpPr>
-        <a:xfrm>
-          <a:off x="0" y="0"/>
-          <a:ext cx="0" cy="0"/>
-          <a:chOff x="0" y="0"/>
-          <a:chExt cx="0" cy="0"/>
-        </a:xfrm>
-      </p:grpSpPr>
-      <p:sp>
-        <p:nvSpPr>
-          <p:cNvPr id="2" name="Título 1"/>
-          <p:cNvSpPr>
-            <a:spLocks noGrp="1"/>
-          </p:cNvSpPr>
-          <p:nvPr>
-            <p:ph type="title"/>
-          </p:nvPr>
-        </p:nvSpPr>
-        <p:spPr/>
-        <p:txBody>
-          <a:bodyPr>
-            <a:normAutofit/>
-          </a:bodyPr>
-          <a:lstStyle/>
-          <a:p>
-            <a:endParaRPr lang="pt-BR" sz="4600" b="1" dirty="0">
-              <a:solidFill>
-                <a:schemeClr val="accent2">
-                  <a:lumMod val="75000"/>
-                </a:schemeClr>
-              </a:solidFill>
-              <a:latin typeface="Times New Roman" panose="02020603050405020304" pitchFamily="18" charset="0"/>
-              <a:cs typeface="Times New Roman" panose="02020603050405020304" pitchFamily="18" charset="0"/>
-            </a:endParaRPr>
-          </a:p>
-        </p:txBody>
-      </p:sp>
-      <p:graphicFrame>
-        <p:nvGraphicFramePr>
-          <p:cNvPr id="8" name="Espaço Reservado para Conteúdo 7"/>
-          <p:cNvGraphicFramePr>
-            <a:graphicFrameLocks noGrp="1"/>
-          </p:cNvGraphicFramePr>
-          <p:nvPr>
-            <p:ph idx="1"/>
-            <p:extLst>
-              <p:ext uri="{D42A27DB-BD31-4B8C-83A1-F6EECF244321}">
-                <p14:modId xmlns:p14="http://schemas.microsoft.com/office/powerpoint/2010/main" val="232861768"/>
-              </p:ext>
-            </p:extLst>
-          </p:nvPr>
-        </p:nvGraphicFramePr>
-        <p:xfrm>
-          <a:off x="154546" y="180304"/>
-          <a:ext cx="11797048" cy="6465195"/>
-        </p:xfrm>
-        <a:graphic>
-          <a:graphicData uri="http://schemas.openxmlformats.org/drawingml/2006/chart">
-            <c:chart xmlns:c="http://schemas.openxmlformats.org/drawingml/2006/chart" xmlns:r="http://schemas.openxmlformats.org/officeDocument/2006/relationships" r:id="rId2"/>
-          </a:graphicData>
-        </a:graphic>
-      </p:graphicFrame>
-    </p:spTree>
-    <p:extLst>
-      <p:ext uri="{BB962C8B-B14F-4D97-AF65-F5344CB8AC3E}">
-        <p14:creationId xmlns:p14="http://schemas.microsoft.com/office/powerpoint/2010/main" val="597344595"/>
-      </p:ext>
-    </p:extLst>
-  </p:cSld>
-  <p:clrMapOvr>
-    <a:masterClrMapping/>
-  </p:clrMapOvr>
-  <p:timing>
-    <p:tnLst>
-      <p:par>
-        <p:cTn id="1" dur="indefinite" restart="never" nodeType="tmRoot"/>
-      </p:par>
-    </p:tnLst>
-  </p:timing>
-</p:sld>
-</file>
-
 <file path=ppt/slides/slide3.xml><?xml version="1.0" encoding="utf-8"?>
 <p:sld xmlns:a="http://schemas.openxmlformats.org/drawingml/2006/main" xmlns:r="http://schemas.openxmlformats.org/officeDocument/2006/relationships" xmlns:p="http://schemas.openxmlformats.org/presentationml/2006/main">
   <p:cSld>
@@ -8350,7 +10665,7 @@
           <p:nvPr/>
         </p:nvPicPr>
         <p:blipFill>
-          <a:blip r:embed="rId2">
+          <a:blip r:embed="rId3">
             <a:extLst>
               <a:ext uri="{28A0092B-C50C-407E-A947-70E740481C1C}">
                 <a14:useLocalDpi xmlns:a14="http://schemas.microsoft.com/office/drawing/2010/main" val="0"/>
@@ -8566,14 +10881,23 @@
           <a:p>
             <a:r>
               <a:rPr lang="pt-BR" sz="2400" dirty="0" smtClean="0"/>
-              <a:t>Arranjo físico celular (Alta flexibilidade);</a:t>
-            </a:r>
-          </a:p>
-          <a:p>
+              <a:t>Arranjo físico celular;</a:t>
+            </a:r>
+          </a:p>
+          <a:p>
+            <a:r>
+              <a:rPr lang="pt-BR" sz="2400" dirty="0"/>
+              <a:t>C</a:t>
+            </a:r>
             <a:r>
               <a:rPr lang="pt-BR" sz="2400" dirty="0" smtClean="0"/>
-              <a:t>A composição de máquinas e operadores é realizada de acordo com a intenção das tarefas que deseja-se realizar;</a:t>
-            </a:r>
+              <a:t>omposição de </a:t>
+            </a:r>
+            <a:r>
+              <a:rPr lang="pt-BR" sz="2400" dirty="0" smtClean="0"/>
+              <a:t>Linha de produção;</a:t>
+            </a:r>
+            <a:endParaRPr lang="pt-BR" sz="2400" dirty="0" smtClean="0"/>
           </a:p>
           <a:p>
             <a:r>
@@ -8584,7 +10908,7 @@
           <a:p>
             <a:r>
               <a:rPr lang="pt-BR" sz="2400" dirty="0" smtClean="0"/>
-              <a:t>Em média, um profissional de uma linha de produção opera 3 tipos de maquinas diferentes;</a:t>
+              <a:t>Operadores multifuncionais;</a:t>
             </a:r>
             <a:endParaRPr lang="pt-BR" sz="2400" dirty="0"/>
           </a:p>
@@ -8695,11 +11019,7 @@
           <a:p>
             <a:r>
               <a:rPr lang="pt-BR" sz="2400" dirty="0" smtClean="0"/>
-              <a:t>Sujeita a movimentações</a:t>
-            </a:r>
-            <a:r>
-              <a:rPr lang="pt-BR" sz="2400" dirty="0" smtClean="0"/>
-              <a:t>;</a:t>
+              <a:t>Sujeita a movimentações;</a:t>
             </a:r>
           </a:p>
           <a:p>
@@ -8756,7 +11076,7 @@
           <p:nvPr/>
         </p:nvPicPr>
         <p:blipFill>
-          <a:blip r:embed="rId2" cstate="print">
+          <a:blip r:embed="rId3" cstate="print">
             <a:extLst>
               <a:ext uri="{28A0092B-C50C-407E-A947-70E740481C1C}">
                 <a14:useLocalDpi xmlns:a14="http://schemas.microsoft.com/office/drawing/2010/main" val="0"/>
@@ -8782,6 +11102,103 @@
           </a:ln>
         </p:spPr>
       </p:pic>
+      <p:sp>
+        <p:nvSpPr>
+          <p:cNvPr id="4" name="Retângulo 3"/>
+          <p:cNvSpPr/>
+          <p:nvPr/>
+        </p:nvSpPr>
+        <p:spPr>
+          <a:xfrm>
+            <a:off x="7872425" y="1141940"/>
+            <a:ext cx="1985677" cy="204047"/>
+          </a:xfrm>
+          <a:prstGeom prst="rect">
+            <a:avLst/>
+          </a:prstGeom>
+          <a:solidFill>
+            <a:schemeClr val="bg1"/>
+          </a:solidFill>
+          <a:ln>
+            <a:solidFill>
+              <a:schemeClr val="bg1"/>
+            </a:solidFill>
+          </a:ln>
+        </p:spPr>
+        <p:style>
+          <a:lnRef idx="2">
+            <a:schemeClr val="accent6"/>
+          </a:lnRef>
+          <a:fillRef idx="1">
+            <a:schemeClr val="lt1"/>
+          </a:fillRef>
+          <a:effectRef idx="0">
+            <a:schemeClr val="accent6"/>
+          </a:effectRef>
+          <a:fontRef idx="minor">
+            <a:schemeClr val="dk1"/>
+          </a:fontRef>
+        </p:style>
+        <p:txBody>
+          <a:bodyPr rtlCol="0" anchor="ctr"/>
+          <a:lstStyle/>
+          <a:p>
+            <a:pPr algn="ctr"/>
+            <a:endParaRPr lang="pt-BR"/>
+          </a:p>
+        </p:txBody>
+      </p:sp>
+      <p:sp>
+        <p:nvSpPr>
+          <p:cNvPr id="7" name="CaixaDeTexto 6"/>
+          <p:cNvSpPr txBox="1"/>
+          <p:nvPr/>
+        </p:nvSpPr>
+        <p:spPr>
+          <a:xfrm>
+            <a:off x="8395063" y="1074468"/>
+            <a:ext cx="1524000" cy="261610"/>
+          </a:xfrm>
+          <a:prstGeom prst="rect">
+            <a:avLst/>
+          </a:prstGeom>
+          <a:noFill/>
+        </p:spPr>
+        <p:txBody>
+          <a:bodyPr wrap="square" rtlCol="0">
+            <a:spAutoFit/>
+          </a:bodyPr>
+          <a:lstStyle/>
+          <a:p>
+            <a:pPr algn="r"/>
+            <a:r>
+              <a:rPr lang="pt-BR" sz="1100" dirty="0" smtClean="0">
+                <a:latin typeface="Times New Roman" panose="02020603050405020304" pitchFamily="18" charset="0"/>
+                <a:cs typeface="Times New Roman" panose="02020603050405020304" pitchFamily="18" charset="0"/>
+              </a:rPr>
+              <a:t>Empresarial </a:t>
+            </a:r>
+            <a:r>
+              <a:rPr lang="pt-BR" sz="1100" dirty="0" err="1" smtClean="0">
+                <a:latin typeface="Times New Roman" panose="02020603050405020304" pitchFamily="18" charset="0"/>
+                <a:cs typeface="Times New Roman" panose="02020603050405020304" pitchFamily="18" charset="0"/>
+              </a:rPr>
+              <a:t>Export</a:t>
+            </a:r>
+            <a:r>
+              <a:rPr lang="pt-BR" sz="1100" dirty="0" smtClean="0">
+                <a:latin typeface="Times New Roman" panose="02020603050405020304" pitchFamily="18" charset="0"/>
+                <a:cs typeface="Times New Roman" panose="02020603050405020304" pitchFamily="18" charset="0"/>
+              </a:rPr>
+              <a:t> SA</a:t>
+            </a:r>
+            <a:endParaRPr lang="pt-BR" sz="1100" dirty="0">
+              <a:latin typeface="Times New Roman" panose="02020603050405020304" pitchFamily="18" charset="0"/>
+              <a:cs typeface="Times New Roman" panose="02020603050405020304" pitchFamily="18" charset="0"/>
+            </a:endParaRPr>
+          </a:p>
+        </p:txBody>
+      </p:sp>
     </p:spTree>
     <p:extLst>
       <p:ext uri="{BB962C8B-B14F-4D97-AF65-F5344CB8AC3E}">
@@ -8878,32 +11295,23 @@
           <a:p>
             <a:r>
               <a:rPr lang="pt-BR" sz="2800" dirty="0" smtClean="0"/>
-              <a:t>Novos produtos ou </a:t>
-            </a:r>
+              <a:t>Novos produtos ou atualização de dados;</a:t>
+            </a:r>
+          </a:p>
+          <a:p>
             <a:r>
               <a:rPr lang="pt-BR" sz="2800" dirty="0" smtClean="0"/>
-              <a:t>atualização de dados;</a:t>
-            </a:r>
-          </a:p>
-          <a:p>
+              <a:t>Reaproveitamento de tempo cronometrado;</a:t>
+            </a:r>
+          </a:p>
+          <a:p>
+            <a:r>
+              <a:rPr lang="pt-BR" sz="2800" dirty="0"/>
+              <a:t>T</a:t>
+            </a:r>
             <a:r>
               <a:rPr lang="pt-BR" sz="2800" dirty="0" smtClean="0"/>
-              <a:t>Reaproveitamento </a:t>
-            </a:r>
-            <a:r>
-              <a:rPr lang="pt-BR" sz="2800" dirty="0" smtClean="0"/>
-              <a:t>de tempo </a:t>
-            </a:r>
-            <a:r>
-              <a:rPr lang="pt-BR" sz="2800" dirty="0" smtClean="0"/>
-              <a:t>cronometrado;</a:t>
-            </a:r>
-            <a:endParaRPr lang="pt-BR" sz="2800" dirty="0" smtClean="0"/>
-          </a:p>
-          <a:p>
-            <a:r>
-              <a:rPr lang="pt-BR" sz="2800" dirty="0" smtClean="0"/>
-              <a:t>Em média, a tiragem de tempos é realizado 10 vezes para a mesma operação, sendo a média destes tempos o valor aproveitado.</a:t>
+              <a:t>iragem de tempos;</a:t>
             </a:r>
             <a:endParaRPr lang="pt-BR" sz="2800" dirty="0"/>
           </a:p>
@@ -9033,8 +11441,8 @@
         </p:nvSpPr>
         <p:spPr>
           <a:xfrm>
-            <a:off x="677334" y="1792099"/>
-            <a:ext cx="8596668" cy="3880773"/>
+            <a:off x="677333" y="1792099"/>
+            <a:ext cx="9071577" cy="3880773"/>
           </a:xfrm>
         </p:spPr>
         <p:txBody>
@@ -9057,7 +11465,15 @@
           <a:p>
             <a:r>
               <a:rPr lang="pt-BR" sz="2800" dirty="0" smtClean="0"/>
-              <a:t>Modo empírico;</a:t>
+              <a:t>Modo empírico (problema NP-</a:t>
+            </a:r>
+            <a:r>
+              <a:rPr lang="pt-BR" sz="2800" dirty="0"/>
+              <a:t>H</a:t>
+            </a:r>
+            <a:r>
+              <a:rPr lang="pt-BR" sz="2800" dirty="0" smtClean="0"/>
+              <a:t>ard);</a:t>
             </a:r>
             <a:endParaRPr lang="pt-BR" sz="2800" dirty="0"/>
           </a:p>
@@ -9368,4 +11784,265 @@
     </a:ext>
   </a:extLst>
 </a:theme>
+</file>
+
+<file path=ppt/theme/theme2.xml><?xml version="1.0" encoding="utf-8"?>
+<a:theme xmlns:a="http://schemas.openxmlformats.org/drawingml/2006/main" name="Tema do Office">
+  <a:themeElements>
+    <a:clrScheme name="Escritório">
+      <a:dk1>
+        <a:sysClr val="windowText" lastClr="000000"/>
+      </a:dk1>
+      <a:lt1>
+        <a:sysClr val="window" lastClr="FFFFFF"/>
+      </a:lt1>
+      <a:dk2>
+        <a:srgbClr val="44546A"/>
+      </a:dk2>
+      <a:lt2>
+        <a:srgbClr val="E7E6E6"/>
+      </a:lt2>
+      <a:accent1>
+        <a:srgbClr val="5B9BD5"/>
+      </a:accent1>
+      <a:accent2>
+        <a:srgbClr val="ED7D31"/>
+      </a:accent2>
+      <a:accent3>
+        <a:srgbClr val="A5A5A5"/>
+      </a:accent3>
+      <a:accent4>
+        <a:srgbClr val="FFC000"/>
+      </a:accent4>
+      <a:accent5>
+        <a:srgbClr val="4472C4"/>
+      </a:accent5>
+      <a:accent6>
+        <a:srgbClr val="70AD47"/>
+      </a:accent6>
+      <a:hlink>
+        <a:srgbClr val="0563C1"/>
+      </a:hlink>
+      <a:folHlink>
+        <a:srgbClr val="954F72"/>
+      </a:folHlink>
+    </a:clrScheme>
+    <a:fontScheme name="Escritório">
+      <a:majorFont>
+        <a:latin typeface="Calibri Light" panose="020F0302020204030204"/>
+        <a:ea typeface=""/>
+        <a:cs typeface=""/>
+        <a:font script="Jpan" typeface="ＭＳ Ｐゴシック"/>
+        <a:font script="Hang" typeface="맑은 고딕"/>
+        <a:font script="Hans" typeface="宋体"/>
+        <a:font script="Hant" typeface="新細明體"/>
+        <a:font script="Arab" typeface="Times New Roman"/>
+        <a:font script="Hebr" typeface="Times New Roman"/>
+        <a:font script="Thai" typeface="Angsana New"/>
+        <a:font script="Ethi" typeface="Nyala"/>
+        <a:font script="Beng" typeface="Vrinda"/>
+        <a:font script="Gujr" typeface="Shruti"/>
+        <a:font script="Khmr" typeface="MoolBoran"/>
+        <a:font script="Knda" typeface="Tunga"/>
+        <a:font script="Guru" typeface="Raavi"/>
+        <a:font script="Cans" typeface="Euphemia"/>
+        <a:font script="Cher" typeface="Plantagenet Cherokee"/>
+        <a:font script="Yiii" typeface="Microsoft Yi Baiti"/>
+        <a:font script="Tibt" typeface="Microsoft Himalaya"/>
+        <a:font script="Thaa" typeface="MV Boli"/>
+        <a:font script="Deva" typeface="Mangal"/>
+        <a:font script="Telu" typeface="Gautami"/>
+        <a:font script="Taml" typeface="Latha"/>
+        <a:font script="Syrc" typeface="Estrangelo Edessa"/>
+        <a:font script="Orya" typeface="Kalinga"/>
+        <a:font script="Mlym" typeface="Kartika"/>
+        <a:font script="Laoo" typeface="DokChampa"/>
+        <a:font script="Sinh" typeface="Iskoola Pota"/>
+        <a:font script="Mong" typeface="Mongolian Baiti"/>
+        <a:font script="Viet" typeface="Times New Roman"/>
+        <a:font script="Uigh" typeface="Microsoft Uighur"/>
+        <a:font script="Geor" typeface="Sylfaen"/>
+      </a:majorFont>
+      <a:minorFont>
+        <a:latin typeface="Calibri" panose="020F0502020204030204"/>
+        <a:ea typeface=""/>
+        <a:cs typeface=""/>
+        <a:font script="Jpan" typeface="ＭＳ Ｐゴシック"/>
+        <a:font script="Hang" typeface="맑은 고딕"/>
+        <a:font script="Hans" typeface="宋体"/>
+        <a:font script="Hant" typeface="新細明體"/>
+        <a:font script="Arab" typeface="Arial"/>
+        <a:font script="Hebr" typeface="Arial"/>
+        <a:font script="Thai" typeface="Cordia New"/>
+        <a:font script="Ethi" typeface="Nyala"/>
+        <a:font script="Beng" typeface="Vrinda"/>
+        <a:font script="Gujr" typeface="Shruti"/>
+        <a:font script="Khmr" typeface="DaunPenh"/>
+        <a:font script="Knda" typeface="Tunga"/>
+        <a:font script="Guru" typeface="Raavi"/>
+        <a:font script="Cans" typeface="Euphemia"/>
+        <a:font script="Cher" typeface="Plantagenet Cherokee"/>
+        <a:font script="Yiii" typeface="Microsoft Yi Baiti"/>
+        <a:font script="Tibt" typeface="Microsoft Himalaya"/>
+        <a:font script="Thaa" typeface="MV Boli"/>
+        <a:font script="Deva" typeface="Mangal"/>
+        <a:font script="Telu" typeface="Gautami"/>
+        <a:font script="Taml" typeface="Latha"/>
+        <a:font script="Syrc" typeface="Estrangelo Edessa"/>
+        <a:font script="Orya" typeface="Kalinga"/>
+        <a:font script="Mlym" typeface="Kartika"/>
+        <a:font script="Laoo" typeface="DokChampa"/>
+        <a:font script="Sinh" typeface="Iskoola Pota"/>
+        <a:font script="Mong" typeface="Mongolian Baiti"/>
+        <a:font script="Viet" typeface="Arial"/>
+        <a:font script="Uigh" typeface="Microsoft Uighur"/>
+        <a:font script="Geor" typeface="Sylfaen"/>
+      </a:minorFont>
+    </a:fontScheme>
+    <a:fmtScheme name="Escritório">
+      <a:fillStyleLst>
+        <a:solidFill>
+          <a:schemeClr val="phClr"/>
+        </a:solidFill>
+        <a:gradFill rotWithShape="1">
+          <a:gsLst>
+            <a:gs pos="0">
+              <a:schemeClr val="phClr">
+                <a:lumMod val="110000"/>
+                <a:satMod val="105000"/>
+                <a:tint val="67000"/>
+              </a:schemeClr>
+            </a:gs>
+            <a:gs pos="50000">
+              <a:schemeClr val="phClr">
+                <a:lumMod val="105000"/>
+                <a:satMod val="103000"/>
+                <a:tint val="73000"/>
+              </a:schemeClr>
+            </a:gs>
+            <a:gs pos="100000">
+              <a:schemeClr val="phClr">
+                <a:lumMod val="105000"/>
+                <a:satMod val="109000"/>
+                <a:tint val="81000"/>
+              </a:schemeClr>
+            </a:gs>
+          </a:gsLst>
+          <a:lin ang="5400000" scaled="0"/>
+        </a:gradFill>
+        <a:gradFill rotWithShape="1">
+          <a:gsLst>
+            <a:gs pos="0">
+              <a:schemeClr val="phClr">
+                <a:satMod val="103000"/>
+                <a:lumMod val="102000"/>
+                <a:tint val="94000"/>
+              </a:schemeClr>
+            </a:gs>
+            <a:gs pos="50000">
+              <a:schemeClr val="phClr">
+                <a:satMod val="110000"/>
+                <a:lumMod val="100000"/>
+                <a:shade val="100000"/>
+              </a:schemeClr>
+            </a:gs>
+            <a:gs pos="100000">
+              <a:schemeClr val="phClr">
+                <a:lumMod val="99000"/>
+                <a:satMod val="120000"/>
+                <a:shade val="78000"/>
+              </a:schemeClr>
+            </a:gs>
+          </a:gsLst>
+          <a:lin ang="5400000" scaled="0"/>
+        </a:gradFill>
+      </a:fillStyleLst>
+      <a:lnStyleLst>
+        <a:ln w="6350" cap="flat" cmpd="sng" algn="ctr">
+          <a:solidFill>
+            <a:schemeClr val="phClr"/>
+          </a:solidFill>
+          <a:prstDash val="solid"/>
+          <a:miter lim="800000"/>
+        </a:ln>
+        <a:ln w="12700" cap="flat" cmpd="sng" algn="ctr">
+          <a:solidFill>
+            <a:schemeClr val="phClr"/>
+          </a:solidFill>
+          <a:prstDash val="solid"/>
+          <a:miter lim="800000"/>
+        </a:ln>
+        <a:ln w="19050" cap="flat" cmpd="sng" algn="ctr">
+          <a:solidFill>
+            <a:schemeClr val="phClr"/>
+          </a:solidFill>
+          <a:prstDash val="solid"/>
+          <a:miter lim="800000"/>
+        </a:ln>
+      </a:lnStyleLst>
+      <a:effectStyleLst>
+        <a:effectStyle>
+          <a:effectLst/>
+        </a:effectStyle>
+        <a:effectStyle>
+          <a:effectLst/>
+        </a:effectStyle>
+        <a:effectStyle>
+          <a:effectLst>
+            <a:outerShdw blurRad="57150" dist="19050" dir="5400000" algn="ctr" rotWithShape="0">
+              <a:srgbClr val="000000">
+                <a:alpha val="63000"/>
+              </a:srgbClr>
+            </a:outerShdw>
+          </a:effectLst>
+        </a:effectStyle>
+      </a:effectStyleLst>
+      <a:bgFillStyleLst>
+        <a:solidFill>
+          <a:schemeClr val="phClr"/>
+        </a:solidFill>
+        <a:solidFill>
+          <a:schemeClr val="phClr">
+            <a:tint val="95000"/>
+            <a:satMod val="170000"/>
+          </a:schemeClr>
+        </a:solidFill>
+        <a:gradFill rotWithShape="1">
+          <a:gsLst>
+            <a:gs pos="0">
+              <a:schemeClr val="phClr">
+                <a:tint val="93000"/>
+                <a:satMod val="150000"/>
+                <a:shade val="98000"/>
+                <a:lumMod val="102000"/>
+              </a:schemeClr>
+            </a:gs>
+            <a:gs pos="50000">
+              <a:schemeClr val="phClr">
+                <a:tint val="98000"/>
+                <a:satMod val="130000"/>
+                <a:shade val="90000"/>
+                <a:lumMod val="103000"/>
+              </a:schemeClr>
+            </a:gs>
+            <a:gs pos="100000">
+              <a:schemeClr val="phClr">
+                <a:shade val="63000"/>
+                <a:satMod val="120000"/>
+              </a:schemeClr>
+            </a:gs>
+          </a:gsLst>
+          <a:lin ang="5400000" scaled="0"/>
+        </a:gradFill>
+      </a:bgFillStyleLst>
+    </a:fmtScheme>
+  </a:themeElements>
+  <a:objectDefaults/>
+  <a:extraClrSchemeLst/>
+  <a:extLst>
+    <a:ext uri="{05A4C25C-085E-4340-85A3-A5531E510DB2}">
+      <thm15:themeFamily xmlns:thm15="http://schemas.microsoft.com/office/thememl/2012/main" name="Office Theme" id="{62F939B6-93AF-4DB8-9C6B-D6C7DFDC589F}" vid="{4A3C46E8-61CC-4603-A589-7422A47A8E4A}"/>
+    </a:ext>
+  </a:extLst>
+</a:theme>
 </file>
</xml_diff>